<commit_message>
commit sebelum fix kode button go
</commit_message>
<xml_diff>
--- a/trash/Proto Mixed.pptx
+++ b/trash/Proto Mixed.pptx
@@ -8425,555 +8425,6 @@
           <a:chExt cx="0" cy="0"/>
         </a:xfrm>
       </p:grpSpPr>
-      <p:sp>
-        <p:nvSpPr>
-          <p:cNvPr id="3" name="Rectangle 2">
-            <a:extLst>
-              <a:ext uri="{FF2B5EF4-FFF2-40B4-BE49-F238E27FC236}">
-                <a16:creationId xmlns:a16="http://schemas.microsoft.com/office/drawing/2014/main" id="{0A778D15-836B-5E26-C708-59DC445BE65E}"/>
-              </a:ext>
-            </a:extLst>
-          </p:cNvPr>
-          <p:cNvSpPr/>
-          <p:nvPr/>
-        </p:nvSpPr>
-        <p:spPr>
-          <a:xfrm>
-            <a:off x="3878179" y="4555958"/>
-            <a:ext cx="280737" cy="915724"/>
-          </a:xfrm>
-          <a:prstGeom prst="rect">
-            <a:avLst/>
-          </a:prstGeom>
-        </p:spPr>
-        <p:style>
-          <a:lnRef idx="2">
-            <a:schemeClr val="accent1">
-              <a:shade val="15000"/>
-            </a:schemeClr>
-          </a:lnRef>
-          <a:fillRef idx="1">
-            <a:schemeClr val="accent1"/>
-          </a:fillRef>
-          <a:effectRef idx="0">
-            <a:schemeClr val="accent1"/>
-          </a:effectRef>
-          <a:fontRef idx="minor">
-            <a:schemeClr val="lt1"/>
-          </a:fontRef>
-        </p:style>
-        <p:txBody>
-          <a:bodyPr rtlCol="0" anchor="ctr"/>
-          <a:lstStyle/>
-          <a:p>
-            <a:pPr algn="ctr"/>
-            <a:endParaRPr lang="en-ID"/>
-          </a:p>
-        </p:txBody>
-      </p:sp>
-      <p:grpSp>
-        <p:nvGrpSpPr>
-          <p:cNvPr id="2" name="Group 1">
-            <a:extLst>
-              <a:ext uri="{FF2B5EF4-FFF2-40B4-BE49-F238E27FC236}">
-                <a16:creationId xmlns:a16="http://schemas.microsoft.com/office/drawing/2014/main" id="{C3CBC344-C9B4-CC15-78BA-81DBC9D96B69}"/>
-              </a:ext>
-            </a:extLst>
-          </p:cNvPr>
-          <p:cNvGrpSpPr/>
-          <p:nvPr/>
-        </p:nvGrpSpPr>
-        <p:grpSpPr>
-          <a:xfrm rot="13500000">
-            <a:off x="3668160" y="2127850"/>
-            <a:ext cx="2520000" cy="2883391"/>
-            <a:chOff x="3668160" y="2127850"/>
-            <a:chExt cx="2520000" cy="2883391"/>
-          </a:xfrm>
-        </p:grpSpPr>
-        <p:sp>
-          <p:nvSpPr>
-            <p:cNvPr id="19" name="Freeform: Shape 18">
-              <a:extLst>
-                <a:ext uri="{FF2B5EF4-FFF2-40B4-BE49-F238E27FC236}">
-                  <a16:creationId xmlns:a16="http://schemas.microsoft.com/office/drawing/2014/main" id="{07285CF8-1084-E2B6-BA86-133FAE130E5B}"/>
-                </a:ext>
-              </a:extLst>
-            </p:cNvPr>
-            <p:cNvSpPr/>
-            <p:nvPr/>
-          </p:nvSpPr>
-          <p:spPr>
-            <a:xfrm>
-              <a:off x="3668160" y="2131241"/>
-              <a:ext cx="2520000" cy="2880000"/>
-            </a:xfrm>
-            <a:custGeom>
-              <a:avLst/>
-              <a:gdLst>
-                <a:gd name="csX0" fmla="*/ 1183677 w 2369574"/>
-                <a:gd name="csY0" fmla="*/ 0 h 2924441"/>
-                <a:gd name="csX1" fmla="*/ 1522926 w 2369574"/>
-                <a:gd name="csY1" fmla="*/ 132080 h 2924441"/>
-                <a:gd name="csX2" fmla="*/ 1525475 w 2369574"/>
-                <a:gd name="csY2" fmla="*/ 132080 h 2924441"/>
-                <a:gd name="csX3" fmla="*/ 1525475 w 2369574"/>
-                <a:gd name="csY3" fmla="*/ 749497 h 2924441"/>
-                <a:gd name="csX4" fmla="*/ 1537107 w 2369574"/>
-                <a:gd name="csY4" fmla="*/ 752302 h 2924441"/>
-                <a:gd name="csX5" fmla="*/ 2369574 w 2369574"/>
-                <a:gd name="csY5" fmla="*/ 1813396 h 2924441"/>
-                <a:gd name="csX6" fmla="*/ 1184787 w 2369574"/>
-                <a:gd name="csY6" fmla="*/ 2924441 h 2924441"/>
-                <a:gd name="csX7" fmla="*/ 0 w 2369574"/>
-                <a:gd name="csY7" fmla="*/ 1813396 h 2924441"/>
-                <a:gd name="csX8" fmla="*/ 832467 w 2369574"/>
-                <a:gd name="csY8" fmla="*/ 752302 h 2924441"/>
-                <a:gd name="csX9" fmla="*/ 844100 w 2369574"/>
-                <a:gd name="csY9" fmla="*/ 749497 h 2924441"/>
-                <a:gd name="csX10" fmla="*/ 844100 w 2369574"/>
-                <a:gd name="csY10" fmla="*/ 132080 h 2924441"/>
-                <a:gd name="csX11" fmla="*/ 844428 w 2369574"/>
-                <a:gd name="csY11" fmla="*/ 132080 h 2924441"/>
-                <a:gd name="csX12" fmla="*/ 1183677 w 2369574"/>
-                <a:gd name="csY12" fmla="*/ 0 h 2924441"/>
-              </a:gdLst>
-              <a:ahLst/>
-              <a:cxnLst>
-                <a:cxn ang="0">
-                  <a:pos x="csX0" y="csY0"/>
-                </a:cxn>
-                <a:cxn ang="0">
-                  <a:pos x="csX1" y="csY1"/>
-                </a:cxn>
-                <a:cxn ang="0">
-                  <a:pos x="csX2" y="csY2"/>
-                </a:cxn>
-                <a:cxn ang="0">
-                  <a:pos x="csX3" y="csY3"/>
-                </a:cxn>
-                <a:cxn ang="0">
-                  <a:pos x="csX4" y="csY4"/>
-                </a:cxn>
-                <a:cxn ang="0">
-                  <a:pos x="csX5" y="csY5"/>
-                </a:cxn>
-                <a:cxn ang="0">
-                  <a:pos x="csX6" y="csY6"/>
-                </a:cxn>
-                <a:cxn ang="0">
-                  <a:pos x="csX7" y="csY7"/>
-                </a:cxn>
-                <a:cxn ang="0">
-                  <a:pos x="csX8" y="csY8"/>
-                </a:cxn>
-                <a:cxn ang="0">
-                  <a:pos x="csX9" y="csY9"/>
-                </a:cxn>
-                <a:cxn ang="0">
-                  <a:pos x="csX10" y="csY10"/>
-                </a:cxn>
-                <a:cxn ang="0">
-                  <a:pos x="csX11" y="csY11"/>
-                </a:cxn>
-                <a:cxn ang="0">
-                  <a:pos x="csX12" y="csY12"/>
-                </a:cxn>
-              </a:cxnLst>
-              <a:rect l="l" t="t" r="r" b="b"/>
-              <a:pathLst>
-                <a:path w="2369574" h="2924441">
-                  <a:moveTo>
-                    <a:pt x="1183677" y="0"/>
-                  </a:moveTo>
-                  <a:cubicBezTo>
-                    <a:pt x="1371039" y="0"/>
-                    <a:pt x="1522926" y="59134"/>
-                    <a:pt x="1522926" y="132080"/>
-                  </a:cubicBezTo>
-                  <a:lnTo>
-                    <a:pt x="1525475" y="132080"/>
-                  </a:lnTo>
-                  <a:lnTo>
-                    <a:pt x="1525475" y="749497"/>
-                  </a:lnTo>
-                  <a:lnTo>
-                    <a:pt x="1537107" y="752302"/>
-                  </a:lnTo>
-                  <a:cubicBezTo>
-                    <a:pt x="2019396" y="892973"/>
-                    <a:pt x="2369574" y="1314836"/>
-                    <a:pt x="2369574" y="1813396"/>
-                  </a:cubicBezTo>
-                  <a:cubicBezTo>
-                    <a:pt x="2369574" y="2427009"/>
-                    <a:pt x="1839127" y="2924441"/>
-                    <a:pt x="1184787" y="2924441"/>
-                  </a:cubicBezTo>
-                  <a:cubicBezTo>
-                    <a:pt x="530447" y="2924441"/>
-                    <a:pt x="0" y="2427009"/>
-                    <a:pt x="0" y="1813396"/>
-                  </a:cubicBezTo>
-                  <a:cubicBezTo>
-                    <a:pt x="0" y="1314836"/>
-                    <a:pt x="350178" y="892973"/>
-                    <a:pt x="832467" y="752302"/>
-                  </a:cubicBezTo>
-                  <a:lnTo>
-                    <a:pt x="844100" y="749497"/>
-                  </a:lnTo>
-                  <a:lnTo>
-                    <a:pt x="844100" y="132080"/>
-                  </a:lnTo>
-                  <a:lnTo>
-                    <a:pt x="844428" y="132080"/>
-                  </a:lnTo>
-                  <a:cubicBezTo>
-                    <a:pt x="844428" y="59134"/>
-                    <a:pt x="996315" y="0"/>
-                    <a:pt x="1183677" y="0"/>
-                  </a:cubicBezTo>
-                  <a:close/>
-                </a:path>
-              </a:pathLst>
-            </a:custGeom>
-            <a:gradFill flip="none" rotWithShape="1">
-              <a:gsLst>
-                <a:gs pos="0">
-                  <a:schemeClr val="accent1">
-                    <a:lumMod val="5000"/>
-                    <a:lumOff val="95000"/>
-                    <a:alpha val="0"/>
-                  </a:schemeClr>
-                </a:gs>
-                <a:gs pos="100000">
-                  <a:schemeClr val="accent1">
-                    <a:lumMod val="5000"/>
-                    <a:lumOff val="95000"/>
-                    <a:alpha val="0"/>
-                  </a:schemeClr>
-                </a:gs>
-                <a:gs pos="50000">
-                  <a:schemeClr val="bg1"/>
-                </a:gs>
-              </a:gsLst>
-              <a:lin ang="2700000" scaled="1"/>
-              <a:tileRect/>
-            </a:gradFill>
-            <a:ln w="19050"/>
-          </p:spPr>
-          <p:style>
-            <a:lnRef idx="2">
-              <a:schemeClr val="accent1">
-                <a:shade val="15000"/>
-              </a:schemeClr>
-            </a:lnRef>
-            <a:fillRef idx="1">
-              <a:schemeClr val="accent1"/>
-            </a:fillRef>
-            <a:effectRef idx="0">
-              <a:schemeClr val="accent1"/>
-            </a:effectRef>
-            <a:fontRef idx="minor">
-              <a:schemeClr val="lt1"/>
-            </a:fontRef>
-          </p:style>
-          <p:txBody>
-            <a:bodyPr wrap="square" rtlCol="0" anchor="ctr">
-              <a:noAutofit/>
-            </a:bodyPr>
-            <a:lstStyle/>
-            <a:p>
-              <a:pPr algn="ctr"/>
-              <a:endParaRPr lang="en-ID" dirty="0"/>
-            </a:p>
-          </p:txBody>
-        </p:sp>
-        <p:sp>
-          <p:nvSpPr>
-            <p:cNvPr id="30" name="Freeform: Shape 29">
-              <a:extLst>
-                <a:ext uri="{FF2B5EF4-FFF2-40B4-BE49-F238E27FC236}">
-                  <a16:creationId xmlns:a16="http://schemas.microsoft.com/office/drawing/2014/main" id="{EEBDAE95-A8D0-93C0-1451-C17BC99A49B3}"/>
-                </a:ext>
-              </a:extLst>
-            </p:cNvPr>
-            <p:cNvSpPr/>
-            <p:nvPr/>
-          </p:nvSpPr>
-          <p:spPr>
-            <a:xfrm>
-              <a:off x="3739915" y="2131239"/>
-              <a:ext cx="1349442" cy="2817000"/>
-            </a:xfrm>
-            <a:custGeom>
-              <a:avLst/>
-              <a:gdLst>
-                <a:gd name="csX0" fmla="*/ 1188243 w 1349442"/>
-                <a:gd name="csY0" fmla="*/ 0 h 2817000"/>
-                <a:gd name="csX1" fmla="*/ 1223317 w 1349442"/>
-                <a:gd name="csY1" fmla="*/ 2592 h 2817000"/>
-                <a:gd name="csX2" fmla="*/ 1225578 w 1349442"/>
-                <a:gd name="csY2" fmla="*/ 0 h 2817000"/>
-                <a:gd name="csX3" fmla="*/ 1349442 w 1349442"/>
-                <a:gd name="csY3" fmla="*/ 1408500 h 2817000"/>
-                <a:gd name="csX4" fmla="*/ 1225578 w 1349442"/>
-                <a:gd name="csY4" fmla="*/ 2817000 h 2817000"/>
-                <a:gd name="csX5" fmla="*/ 1224200 w 1349442"/>
-                <a:gd name="csY5" fmla="*/ 2815421 h 2817000"/>
-                <a:gd name="csX6" fmla="*/ 1188243 w 1349442"/>
-                <a:gd name="csY6" fmla="*/ 2816999 h 2817000"/>
-                <a:gd name="csX7" fmla="*/ 0 w 1349442"/>
-                <a:gd name="csY7" fmla="*/ 1783536 h 2817000"/>
-                <a:gd name="csX8" fmla="*/ 725725 w 1349442"/>
-                <a:gd name="csY8" fmla="*/ 831288 h 2817000"/>
-                <a:gd name="csX9" fmla="*/ 893996 w 1349442"/>
-                <a:gd name="csY9" fmla="*/ 785858 h 2817000"/>
-                <a:gd name="csX10" fmla="*/ 893996 w 1349442"/>
-                <a:gd name="csY10" fmla="*/ 88084 h 2817000"/>
-                <a:gd name="csX11" fmla="*/ 895634 w 1349442"/>
-                <a:gd name="csY11" fmla="*/ 88084 h 2817000"/>
-                <a:gd name="csX12" fmla="*/ 895634 w 1349442"/>
-                <a:gd name="csY12" fmla="*/ 55306 h 2817000"/>
-                <a:gd name="csX13" fmla="*/ 933098 w 1349442"/>
-                <a:gd name="csY13" fmla="*/ 38685 h 2817000"/>
-                <a:gd name="csX14" fmla="*/ 1188243 w 1349442"/>
-                <a:gd name="csY14" fmla="*/ 0 h 2817000"/>
-              </a:gdLst>
-              <a:ahLst/>
-              <a:cxnLst>
-                <a:cxn ang="0">
-                  <a:pos x="csX0" y="csY0"/>
-                </a:cxn>
-                <a:cxn ang="0">
-                  <a:pos x="csX1" y="csY1"/>
-                </a:cxn>
-                <a:cxn ang="0">
-                  <a:pos x="csX2" y="csY2"/>
-                </a:cxn>
-                <a:cxn ang="0">
-                  <a:pos x="csX3" y="csY3"/>
-                </a:cxn>
-                <a:cxn ang="0">
-                  <a:pos x="csX4" y="csY4"/>
-                </a:cxn>
-                <a:cxn ang="0">
-                  <a:pos x="csX5" y="csY5"/>
-                </a:cxn>
-                <a:cxn ang="0">
-                  <a:pos x="csX6" y="csY6"/>
-                </a:cxn>
-                <a:cxn ang="0">
-                  <a:pos x="csX7" y="csY7"/>
-                </a:cxn>
-                <a:cxn ang="0">
-                  <a:pos x="csX8" y="csY8"/>
-                </a:cxn>
-                <a:cxn ang="0">
-                  <a:pos x="csX9" y="csY9"/>
-                </a:cxn>
-                <a:cxn ang="0">
-                  <a:pos x="csX10" y="csY10"/>
-                </a:cxn>
-                <a:cxn ang="0">
-                  <a:pos x="csX11" y="csY11"/>
-                </a:cxn>
-                <a:cxn ang="0">
-                  <a:pos x="csX12" y="csY12"/>
-                </a:cxn>
-                <a:cxn ang="0">
-                  <a:pos x="csX13" y="csY13"/>
-                </a:cxn>
-                <a:cxn ang="0">
-                  <a:pos x="csX14" y="csY14"/>
-                </a:cxn>
-              </a:cxnLst>
-              <a:rect l="l" t="t" r="r" b="b"/>
-              <a:pathLst>
-                <a:path w="1349442" h="2817000">
-                  <a:moveTo>
-                    <a:pt x="1188243" y="0"/>
-                  </a:moveTo>
-                  <a:lnTo>
-                    <a:pt x="1223317" y="2592"/>
-                  </a:lnTo>
-                  <a:lnTo>
-                    <a:pt x="1225578" y="0"/>
-                  </a:lnTo>
-                  <a:cubicBezTo>
-                    <a:pt x="1293986" y="0"/>
-                    <a:pt x="1349442" y="630607"/>
-                    <a:pt x="1349442" y="1408500"/>
-                  </a:cubicBezTo>
-                  <a:cubicBezTo>
-                    <a:pt x="1349442" y="2186393"/>
-                    <a:pt x="1293986" y="2817000"/>
-                    <a:pt x="1225578" y="2817000"/>
-                  </a:cubicBezTo>
-                  <a:lnTo>
-                    <a:pt x="1224200" y="2815421"/>
-                  </a:lnTo>
-                  <a:lnTo>
-                    <a:pt x="1188243" y="2816999"/>
-                  </a:lnTo>
-                  <a:cubicBezTo>
-                    <a:pt x="531995" y="2816999"/>
-                    <a:pt x="0" y="2354302"/>
-                    <a:pt x="0" y="1783536"/>
-                  </a:cubicBezTo>
-                  <a:cubicBezTo>
-                    <a:pt x="0" y="1355462"/>
-                    <a:pt x="299247" y="988176"/>
-                    <a:pt x="725725" y="831288"/>
-                  </a:cubicBezTo>
-                  <a:lnTo>
-                    <a:pt x="893996" y="785858"/>
-                  </a:lnTo>
-                  <a:lnTo>
-                    <a:pt x="893996" y="88084"/>
-                  </a:lnTo>
-                  <a:lnTo>
-                    <a:pt x="895634" y="88084"/>
-                  </a:lnTo>
-                  <a:lnTo>
-                    <a:pt x="895634" y="55306"/>
-                  </a:lnTo>
-                  <a:lnTo>
-                    <a:pt x="933098" y="38685"/>
-                  </a:lnTo>
-                  <a:cubicBezTo>
-                    <a:pt x="998395" y="14784"/>
-                    <a:pt x="1088603" y="0"/>
-                    <a:pt x="1188243" y="0"/>
-                  </a:cubicBezTo>
-                  <a:close/>
-                </a:path>
-              </a:pathLst>
-            </a:custGeom>
-          </p:spPr>
-          <p:style>
-            <a:lnRef idx="2">
-              <a:schemeClr val="accent1">
-                <a:shade val="15000"/>
-              </a:schemeClr>
-            </a:lnRef>
-            <a:fillRef idx="1">
-              <a:schemeClr val="accent1"/>
-            </a:fillRef>
-            <a:effectRef idx="0">
-              <a:schemeClr val="accent1"/>
-            </a:effectRef>
-            <a:fontRef idx="minor">
-              <a:schemeClr val="lt1"/>
-            </a:fontRef>
-          </p:style>
-          <p:txBody>
-            <a:bodyPr wrap="square" rtlCol="0" anchor="ctr">
-              <a:noAutofit/>
-            </a:bodyPr>
-            <a:lstStyle/>
-            <a:p>
-              <a:pPr algn="ctr"/>
-              <a:endParaRPr lang="en-ID"/>
-            </a:p>
-          </p:txBody>
-        </p:sp>
-        <p:sp>
-          <p:nvSpPr>
-            <p:cNvPr id="29" name="Oval 28">
-              <a:extLst>
-                <a:ext uri="{FF2B5EF4-FFF2-40B4-BE49-F238E27FC236}">
-                  <a16:creationId xmlns:a16="http://schemas.microsoft.com/office/drawing/2014/main" id="{6D46B891-E3DD-5107-80FD-6BD37BCC6047}"/>
-                </a:ext>
-              </a:extLst>
-            </p:cNvPr>
-            <p:cNvSpPr/>
-            <p:nvPr/>
-          </p:nvSpPr>
-          <p:spPr>
-            <a:xfrm>
-              <a:off x="4841632" y="2129545"/>
-              <a:ext cx="247727" cy="2816999"/>
-            </a:xfrm>
-            <a:prstGeom prst="ellipse">
-              <a:avLst/>
-            </a:prstGeom>
-          </p:spPr>
-          <p:style>
-            <a:lnRef idx="2">
-              <a:schemeClr val="accent1">
-                <a:shade val="15000"/>
-              </a:schemeClr>
-            </a:lnRef>
-            <a:fillRef idx="1">
-              <a:schemeClr val="accent1"/>
-            </a:fillRef>
-            <a:effectRef idx="0">
-              <a:schemeClr val="accent1"/>
-            </a:effectRef>
-            <a:fontRef idx="minor">
-              <a:schemeClr val="lt1"/>
-            </a:fontRef>
-          </p:style>
-          <p:txBody>
-            <a:bodyPr rtlCol="0" anchor="ctr"/>
-            <a:lstStyle/>
-            <a:p>
-              <a:pPr algn="ctr"/>
-              <a:endParaRPr lang="en-ID" dirty="0"/>
-            </a:p>
-          </p:txBody>
-        </p:sp>
-        <p:sp>
-          <p:nvSpPr>
-            <p:cNvPr id="31" name="Oval 30">
-              <a:extLst>
-                <a:ext uri="{FF2B5EF4-FFF2-40B4-BE49-F238E27FC236}">
-                  <a16:creationId xmlns:a16="http://schemas.microsoft.com/office/drawing/2014/main" id="{9CF0472B-A342-2E82-C83D-7C8397A32BC0}"/>
-                </a:ext>
-              </a:extLst>
-            </p:cNvPr>
-            <p:cNvSpPr/>
-            <p:nvPr/>
-          </p:nvSpPr>
-          <p:spPr>
-            <a:xfrm>
-              <a:off x="4567330" y="2127850"/>
-              <a:ext cx="721659" cy="264160"/>
-            </a:xfrm>
-            <a:prstGeom prst="ellipse">
-              <a:avLst/>
-            </a:prstGeom>
-            <a:noFill/>
-            <a:ln w="19050"/>
-          </p:spPr>
-          <p:style>
-            <a:lnRef idx="2">
-              <a:schemeClr val="accent1">
-                <a:shade val="15000"/>
-              </a:schemeClr>
-            </a:lnRef>
-            <a:fillRef idx="1">
-              <a:schemeClr val="accent1"/>
-            </a:fillRef>
-            <a:effectRef idx="0">
-              <a:schemeClr val="accent1"/>
-            </a:effectRef>
-            <a:fontRef idx="minor">
-              <a:schemeClr val="lt1"/>
-            </a:fontRef>
-          </p:style>
-          <p:txBody>
-            <a:bodyPr rtlCol="0" anchor="ctr"/>
-            <a:lstStyle/>
-            <a:p>
-              <a:pPr algn="ctr"/>
-              <a:endParaRPr lang="en-ID" dirty="0"/>
-            </a:p>
-          </p:txBody>
-        </p:sp>
-      </p:grpSp>
       <p:grpSp>
         <p:nvGrpSpPr>
           <p:cNvPr id="10" name="Group 9">
@@ -8988,7 +8439,7 @@
         </p:nvGrpSpPr>
         <p:grpSpPr>
           <a:xfrm>
-            <a:off x="7601269" y="2372670"/>
+            <a:off x="8505837" y="2372670"/>
             <a:ext cx="2883391" cy="3162136"/>
             <a:chOff x="7289730" y="2309546"/>
             <a:chExt cx="2883391" cy="3162136"/>
@@ -9543,6 +8994,546 @@
             </p:txBody>
           </p:sp>
         </p:grpSp>
+      </p:grpSp>
+      <p:grpSp>
+        <p:nvGrpSpPr>
+          <p:cNvPr id="16" name="Group 15">
+            <a:extLst>
+              <a:ext uri="{FF2B5EF4-FFF2-40B4-BE49-F238E27FC236}">
+                <a16:creationId xmlns:a16="http://schemas.microsoft.com/office/drawing/2014/main" id="{5D1023C2-1D9D-D8CE-A4E6-0CF276C0E103}"/>
+              </a:ext>
+            </a:extLst>
+          </p:cNvPr>
+          <p:cNvGrpSpPr/>
+          <p:nvPr/>
+        </p:nvGrpSpPr>
+        <p:grpSpPr>
+          <a:xfrm>
+            <a:off x="2669526" y="2269020"/>
+            <a:ext cx="3466156" cy="2549624"/>
+            <a:chOff x="2669526" y="2269020"/>
+            <a:chExt cx="3466156" cy="2549624"/>
+          </a:xfrm>
+        </p:grpSpPr>
+        <p:sp>
+          <p:nvSpPr>
+            <p:cNvPr id="12" name="Freeform: Shape 11">
+              <a:extLst>
+                <a:ext uri="{FF2B5EF4-FFF2-40B4-BE49-F238E27FC236}">
+                  <a16:creationId xmlns:a16="http://schemas.microsoft.com/office/drawing/2014/main" id="{760254BE-9703-EB97-D8A4-296697EFE1B0}"/>
+                </a:ext>
+              </a:extLst>
+            </p:cNvPr>
+            <p:cNvSpPr/>
+            <p:nvPr/>
+          </p:nvSpPr>
+          <p:spPr>
+            <a:xfrm rot="13500000">
+              <a:off x="3031275" y="2089020"/>
+              <a:ext cx="2520000" cy="2880000"/>
+            </a:xfrm>
+            <a:custGeom>
+              <a:avLst/>
+              <a:gdLst>
+                <a:gd name="csX0" fmla="*/ 1183677 w 2369574"/>
+                <a:gd name="csY0" fmla="*/ 0 h 2924441"/>
+                <a:gd name="csX1" fmla="*/ 1522926 w 2369574"/>
+                <a:gd name="csY1" fmla="*/ 132080 h 2924441"/>
+                <a:gd name="csX2" fmla="*/ 1525475 w 2369574"/>
+                <a:gd name="csY2" fmla="*/ 132080 h 2924441"/>
+                <a:gd name="csX3" fmla="*/ 1525475 w 2369574"/>
+                <a:gd name="csY3" fmla="*/ 749497 h 2924441"/>
+                <a:gd name="csX4" fmla="*/ 1537107 w 2369574"/>
+                <a:gd name="csY4" fmla="*/ 752302 h 2924441"/>
+                <a:gd name="csX5" fmla="*/ 2369574 w 2369574"/>
+                <a:gd name="csY5" fmla="*/ 1813396 h 2924441"/>
+                <a:gd name="csX6" fmla="*/ 1184787 w 2369574"/>
+                <a:gd name="csY6" fmla="*/ 2924441 h 2924441"/>
+                <a:gd name="csX7" fmla="*/ 0 w 2369574"/>
+                <a:gd name="csY7" fmla="*/ 1813396 h 2924441"/>
+                <a:gd name="csX8" fmla="*/ 832467 w 2369574"/>
+                <a:gd name="csY8" fmla="*/ 752302 h 2924441"/>
+                <a:gd name="csX9" fmla="*/ 844100 w 2369574"/>
+                <a:gd name="csY9" fmla="*/ 749497 h 2924441"/>
+                <a:gd name="csX10" fmla="*/ 844100 w 2369574"/>
+                <a:gd name="csY10" fmla="*/ 132080 h 2924441"/>
+                <a:gd name="csX11" fmla="*/ 844428 w 2369574"/>
+                <a:gd name="csY11" fmla="*/ 132080 h 2924441"/>
+                <a:gd name="csX12" fmla="*/ 1183677 w 2369574"/>
+                <a:gd name="csY12" fmla="*/ 0 h 2924441"/>
+              </a:gdLst>
+              <a:ahLst/>
+              <a:cxnLst>
+                <a:cxn ang="0">
+                  <a:pos x="csX0" y="csY0"/>
+                </a:cxn>
+                <a:cxn ang="0">
+                  <a:pos x="csX1" y="csY1"/>
+                </a:cxn>
+                <a:cxn ang="0">
+                  <a:pos x="csX2" y="csY2"/>
+                </a:cxn>
+                <a:cxn ang="0">
+                  <a:pos x="csX3" y="csY3"/>
+                </a:cxn>
+                <a:cxn ang="0">
+                  <a:pos x="csX4" y="csY4"/>
+                </a:cxn>
+                <a:cxn ang="0">
+                  <a:pos x="csX5" y="csY5"/>
+                </a:cxn>
+                <a:cxn ang="0">
+                  <a:pos x="csX6" y="csY6"/>
+                </a:cxn>
+                <a:cxn ang="0">
+                  <a:pos x="csX7" y="csY7"/>
+                </a:cxn>
+                <a:cxn ang="0">
+                  <a:pos x="csX8" y="csY8"/>
+                </a:cxn>
+                <a:cxn ang="0">
+                  <a:pos x="csX9" y="csY9"/>
+                </a:cxn>
+                <a:cxn ang="0">
+                  <a:pos x="csX10" y="csY10"/>
+                </a:cxn>
+                <a:cxn ang="0">
+                  <a:pos x="csX11" y="csY11"/>
+                </a:cxn>
+                <a:cxn ang="0">
+                  <a:pos x="csX12" y="csY12"/>
+                </a:cxn>
+              </a:cxnLst>
+              <a:rect l="l" t="t" r="r" b="b"/>
+              <a:pathLst>
+                <a:path w="2369574" h="2924441">
+                  <a:moveTo>
+                    <a:pt x="1183677" y="0"/>
+                  </a:moveTo>
+                  <a:cubicBezTo>
+                    <a:pt x="1371039" y="0"/>
+                    <a:pt x="1522926" y="59134"/>
+                    <a:pt x="1522926" y="132080"/>
+                  </a:cubicBezTo>
+                  <a:lnTo>
+                    <a:pt x="1525475" y="132080"/>
+                  </a:lnTo>
+                  <a:lnTo>
+                    <a:pt x="1525475" y="749497"/>
+                  </a:lnTo>
+                  <a:lnTo>
+                    <a:pt x="1537107" y="752302"/>
+                  </a:lnTo>
+                  <a:cubicBezTo>
+                    <a:pt x="2019396" y="892973"/>
+                    <a:pt x="2369574" y="1314836"/>
+                    <a:pt x="2369574" y="1813396"/>
+                  </a:cubicBezTo>
+                  <a:cubicBezTo>
+                    <a:pt x="2369574" y="2427009"/>
+                    <a:pt x="1839127" y="2924441"/>
+                    <a:pt x="1184787" y="2924441"/>
+                  </a:cubicBezTo>
+                  <a:cubicBezTo>
+                    <a:pt x="530447" y="2924441"/>
+                    <a:pt x="0" y="2427009"/>
+                    <a:pt x="0" y="1813396"/>
+                  </a:cubicBezTo>
+                  <a:cubicBezTo>
+                    <a:pt x="0" y="1314836"/>
+                    <a:pt x="350178" y="892973"/>
+                    <a:pt x="832467" y="752302"/>
+                  </a:cubicBezTo>
+                  <a:lnTo>
+                    <a:pt x="844100" y="749497"/>
+                  </a:lnTo>
+                  <a:lnTo>
+                    <a:pt x="844100" y="132080"/>
+                  </a:lnTo>
+                  <a:lnTo>
+                    <a:pt x="844428" y="132080"/>
+                  </a:lnTo>
+                  <a:cubicBezTo>
+                    <a:pt x="844428" y="59134"/>
+                    <a:pt x="996315" y="0"/>
+                    <a:pt x="1183677" y="0"/>
+                  </a:cubicBezTo>
+                  <a:close/>
+                </a:path>
+              </a:pathLst>
+            </a:custGeom>
+            <a:gradFill flip="none" rotWithShape="1">
+              <a:gsLst>
+                <a:gs pos="0">
+                  <a:schemeClr val="accent1">
+                    <a:lumMod val="5000"/>
+                    <a:lumOff val="95000"/>
+                    <a:alpha val="0"/>
+                  </a:schemeClr>
+                </a:gs>
+                <a:gs pos="100000">
+                  <a:schemeClr val="accent1">
+                    <a:lumMod val="5000"/>
+                    <a:lumOff val="95000"/>
+                    <a:alpha val="0"/>
+                  </a:schemeClr>
+                </a:gs>
+                <a:gs pos="50000">
+                  <a:schemeClr val="bg1"/>
+                </a:gs>
+              </a:gsLst>
+              <a:lin ang="2700000" scaled="1"/>
+              <a:tileRect/>
+            </a:gradFill>
+            <a:ln w="19050"/>
+          </p:spPr>
+          <p:style>
+            <a:lnRef idx="2">
+              <a:schemeClr val="accent1">
+                <a:shade val="15000"/>
+              </a:schemeClr>
+            </a:lnRef>
+            <a:fillRef idx="1">
+              <a:schemeClr val="accent1"/>
+            </a:fillRef>
+            <a:effectRef idx="0">
+              <a:schemeClr val="accent1"/>
+            </a:effectRef>
+            <a:fontRef idx="minor">
+              <a:schemeClr val="lt1"/>
+            </a:fontRef>
+          </p:style>
+          <p:txBody>
+            <a:bodyPr wrap="square" rtlCol="0" anchor="ctr">
+              <a:noAutofit/>
+            </a:bodyPr>
+            <a:lstStyle/>
+            <a:p>
+              <a:pPr algn="ctr"/>
+              <a:endParaRPr lang="en-ID" dirty="0"/>
+            </a:p>
+          </p:txBody>
+        </p:sp>
+        <p:sp>
+          <p:nvSpPr>
+            <p:cNvPr id="13" name="Freeform: Shape 12">
+              <a:extLst>
+                <a:ext uri="{FF2B5EF4-FFF2-40B4-BE49-F238E27FC236}">
+                  <a16:creationId xmlns:a16="http://schemas.microsoft.com/office/drawing/2014/main" id="{E23E6955-279E-12E5-9BC5-0AEE6D31F351}"/>
+                </a:ext>
+              </a:extLst>
+            </p:cNvPr>
+            <p:cNvSpPr/>
+            <p:nvPr/>
+          </p:nvSpPr>
+          <p:spPr>
+            <a:xfrm rot="13500000">
+              <a:off x="3727883" y="2410845"/>
+              <a:ext cx="1349442" cy="3466156"/>
+            </a:xfrm>
+            <a:custGeom>
+              <a:avLst/>
+              <a:gdLst>
+                <a:gd name="csX0" fmla="*/ 1238242 w 1349442"/>
+                <a:gd name="csY0" fmla="*/ 3458884 h 3466156"/>
+                <a:gd name="csX1" fmla="*/ 1225578 w 1349442"/>
+                <a:gd name="csY1" fmla="*/ 3466156 h 3466156"/>
+                <a:gd name="csX2" fmla="*/ 1224200 w 1349442"/>
+                <a:gd name="csY2" fmla="*/ 3464577 h 3466156"/>
+                <a:gd name="csX3" fmla="*/ 1188243 w 1349442"/>
+                <a:gd name="csY3" fmla="*/ 3466155 h 3466156"/>
+                <a:gd name="csX4" fmla="*/ 0 w 1349442"/>
+                <a:gd name="csY4" fmla="*/ 2432692 h 3466156"/>
+                <a:gd name="csX5" fmla="*/ 725725 w 1349442"/>
+                <a:gd name="csY5" fmla="*/ 1480444 h 3466156"/>
+                <a:gd name="csX6" fmla="*/ 893996 w 1349442"/>
+                <a:gd name="csY6" fmla="*/ 1435014 h 3466156"/>
+                <a:gd name="csX7" fmla="*/ 893996 w 1349442"/>
+                <a:gd name="csY7" fmla="*/ 737240 h 3466156"/>
+                <a:gd name="csX8" fmla="*/ 895634 w 1349442"/>
+                <a:gd name="csY8" fmla="*/ 737240 h 3466156"/>
+                <a:gd name="csX9" fmla="*/ 895634 w 1349442"/>
+                <a:gd name="csY9" fmla="*/ 706976 h 3466156"/>
+                <a:gd name="csX10" fmla="*/ 387169 w 1349442"/>
+                <a:gd name="csY10" fmla="*/ 198511 h 3466156"/>
+                <a:gd name="csX11" fmla="*/ 585680 w 1349442"/>
+                <a:gd name="csY11" fmla="*/ 0 h 3466156"/>
+                <a:gd name="csX12" fmla="*/ 1233195 w 1349442"/>
+                <a:gd name="csY12" fmla="*/ 647515 h 3466156"/>
+                <a:gd name="csX13" fmla="*/ 1229374 w 1349442"/>
+                <a:gd name="csY13" fmla="*/ 651336 h 3466156"/>
+                <a:gd name="csX14" fmla="*/ 1238242 w 1349442"/>
+                <a:gd name="csY14" fmla="*/ 656428 h 3466156"/>
+                <a:gd name="csX15" fmla="*/ 1349442 w 1349442"/>
+                <a:gd name="csY15" fmla="*/ 2057656 h 3466156"/>
+                <a:gd name="csX16" fmla="*/ 1238242 w 1349442"/>
+                <a:gd name="csY16" fmla="*/ 3458884 h 3466156"/>
+              </a:gdLst>
+              <a:ahLst/>
+              <a:cxnLst>
+                <a:cxn ang="0">
+                  <a:pos x="csX0" y="csY0"/>
+                </a:cxn>
+                <a:cxn ang="0">
+                  <a:pos x="csX1" y="csY1"/>
+                </a:cxn>
+                <a:cxn ang="0">
+                  <a:pos x="csX2" y="csY2"/>
+                </a:cxn>
+                <a:cxn ang="0">
+                  <a:pos x="csX3" y="csY3"/>
+                </a:cxn>
+                <a:cxn ang="0">
+                  <a:pos x="csX4" y="csY4"/>
+                </a:cxn>
+                <a:cxn ang="0">
+                  <a:pos x="csX5" y="csY5"/>
+                </a:cxn>
+                <a:cxn ang="0">
+                  <a:pos x="csX6" y="csY6"/>
+                </a:cxn>
+                <a:cxn ang="0">
+                  <a:pos x="csX7" y="csY7"/>
+                </a:cxn>
+                <a:cxn ang="0">
+                  <a:pos x="csX8" y="csY8"/>
+                </a:cxn>
+                <a:cxn ang="0">
+                  <a:pos x="csX9" y="csY9"/>
+                </a:cxn>
+                <a:cxn ang="0">
+                  <a:pos x="csX10" y="csY10"/>
+                </a:cxn>
+                <a:cxn ang="0">
+                  <a:pos x="csX11" y="csY11"/>
+                </a:cxn>
+                <a:cxn ang="0">
+                  <a:pos x="csX12" y="csY12"/>
+                </a:cxn>
+                <a:cxn ang="0">
+                  <a:pos x="csX13" y="csY13"/>
+                </a:cxn>
+                <a:cxn ang="0">
+                  <a:pos x="csX14" y="csY14"/>
+                </a:cxn>
+                <a:cxn ang="0">
+                  <a:pos x="csX15" y="csY15"/>
+                </a:cxn>
+                <a:cxn ang="0">
+                  <a:pos x="csX16" y="csY16"/>
+                </a:cxn>
+              </a:cxnLst>
+              <a:rect l="l" t="t" r="r" b="b"/>
+              <a:pathLst>
+                <a:path w="1349442" h="3466156">
+                  <a:moveTo>
+                    <a:pt x="1238242" y="3458884"/>
+                  </a:moveTo>
+                  <a:cubicBezTo>
+                    <a:pt x="1234078" y="3463692"/>
+                    <a:pt x="1229853" y="3466156"/>
+                    <a:pt x="1225578" y="3466156"/>
+                  </a:cubicBezTo>
+                  <a:lnTo>
+                    <a:pt x="1224200" y="3464577"/>
+                  </a:lnTo>
+                  <a:lnTo>
+                    <a:pt x="1188243" y="3466155"/>
+                  </a:lnTo>
+                  <a:cubicBezTo>
+                    <a:pt x="531995" y="3466155"/>
+                    <a:pt x="0" y="3003458"/>
+                    <a:pt x="0" y="2432692"/>
+                  </a:cubicBezTo>
+                  <a:cubicBezTo>
+                    <a:pt x="0" y="2004618"/>
+                    <a:pt x="299247" y="1637332"/>
+                    <a:pt x="725725" y="1480444"/>
+                  </a:cubicBezTo>
+                  <a:lnTo>
+                    <a:pt x="893996" y="1435014"/>
+                  </a:lnTo>
+                  <a:lnTo>
+                    <a:pt x="893996" y="737240"/>
+                  </a:lnTo>
+                  <a:lnTo>
+                    <a:pt x="895634" y="737240"/>
+                  </a:lnTo>
+                  <a:lnTo>
+                    <a:pt x="895634" y="706976"/>
+                  </a:lnTo>
+                  <a:lnTo>
+                    <a:pt x="387169" y="198511"/>
+                  </a:lnTo>
+                  <a:lnTo>
+                    <a:pt x="585680" y="0"/>
+                  </a:lnTo>
+                  <a:lnTo>
+                    <a:pt x="1233195" y="647515"/>
+                  </a:lnTo>
+                  <a:lnTo>
+                    <a:pt x="1229374" y="651336"/>
+                  </a:lnTo>
+                  <a:lnTo>
+                    <a:pt x="1238242" y="656428"/>
+                  </a:lnTo>
+                  <a:cubicBezTo>
+                    <a:pt x="1300701" y="728557"/>
+                    <a:pt x="1349442" y="1328382"/>
+                    <a:pt x="1349442" y="2057656"/>
+                  </a:cubicBezTo>
+                  <a:cubicBezTo>
+                    <a:pt x="1349442" y="2786930"/>
+                    <a:pt x="1300701" y="3386755"/>
+                    <a:pt x="1238242" y="3458884"/>
+                  </a:cubicBezTo>
+                  <a:close/>
+                </a:path>
+              </a:pathLst>
+            </a:custGeom>
+            <a:gradFill>
+              <a:gsLst>
+                <a:gs pos="0">
+                  <a:srgbClr val="B8A18A">
+                    <a:alpha val="0"/>
+                  </a:srgbClr>
+                </a:gs>
+                <a:gs pos="100000">
+                  <a:srgbClr val="3F2A1D">
+                    <a:alpha val="0"/>
+                  </a:srgbClr>
+                </a:gs>
+                <a:gs pos="50000">
+                  <a:srgbClr val="7A5A44"/>
+                </a:gs>
+              </a:gsLst>
+              <a:path path="circle">
+                <a:fillToRect l="50000" t="50000" r="50000" b="50000"/>
+              </a:path>
+            </a:gradFill>
+          </p:spPr>
+          <p:style>
+            <a:lnRef idx="2">
+              <a:schemeClr val="accent1">
+                <a:shade val="15000"/>
+              </a:schemeClr>
+            </a:lnRef>
+            <a:fillRef idx="1">
+              <a:schemeClr val="accent1"/>
+            </a:fillRef>
+            <a:effectRef idx="0">
+              <a:schemeClr val="accent1"/>
+            </a:effectRef>
+            <a:fontRef idx="minor">
+              <a:schemeClr val="lt1"/>
+            </a:fontRef>
+          </p:style>
+          <p:txBody>
+            <a:bodyPr wrap="square" rtlCol="0" anchor="ctr">
+              <a:noAutofit/>
+            </a:bodyPr>
+            <a:lstStyle/>
+            <a:p>
+              <a:pPr algn="ctr"/>
+              <a:endParaRPr lang="en-ID"/>
+            </a:p>
+          </p:txBody>
+        </p:sp>
+        <p:sp>
+          <p:nvSpPr>
+            <p:cNvPr id="14" name="Oval 13">
+              <a:extLst>
+                <a:ext uri="{FF2B5EF4-FFF2-40B4-BE49-F238E27FC236}">
+                  <a16:creationId xmlns:a16="http://schemas.microsoft.com/office/drawing/2014/main" id="{045AE57C-D538-7071-7BBC-1DE0FD91C01C}"/>
+                </a:ext>
+              </a:extLst>
+            </p:cNvPr>
+            <p:cNvSpPr/>
+            <p:nvPr/>
+          </p:nvSpPr>
+          <p:spPr>
+            <a:xfrm rot="13500000">
+              <a:off x="4117538" y="2117593"/>
+              <a:ext cx="247727" cy="2816999"/>
+            </a:xfrm>
+            <a:prstGeom prst="ellipse">
+              <a:avLst/>
+            </a:prstGeom>
+            <a:noFill/>
+          </p:spPr>
+          <p:style>
+            <a:lnRef idx="2">
+              <a:schemeClr val="accent1">
+                <a:shade val="15000"/>
+              </a:schemeClr>
+            </a:lnRef>
+            <a:fillRef idx="1">
+              <a:schemeClr val="accent1"/>
+            </a:fillRef>
+            <a:effectRef idx="0">
+              <a:schemeClr val="accent1"/>
+            </a:effectRef>
+            <a:fontRef idx="minor">
+              <a:schemeClr val="lt1"/>
+            </a:fontRef>
+          </p:style>
+          <p:txBody>
+            <a:bodyPr rtlCol="0" anchor="ctr"/>
+            <a:lstStyle/>
+            <a:p>
+              <a:pPr algn="ctr"/>
+              <a:endParaRPr lang="en-ID" dirty="0"/>
+            </a:p>
+          </p:txBody>
+        </p:sp>
+        <p:sp>
+          <p:nvSpPr>
+            <p:cNvPr id="15" name="Oval 14">
+              <a:extLst>
+                <a:ext uri="{FF2B5EF4-FFF2-40B4-BE49-F238E27FC236}">
+                  <a16:creationId xmlns:a16="http://schemas.microsoft.com/office/drawing/2014/main" id="{4F94DDE8-7134-9436-AABC-8CDFD195E3E5}"/>
+                </a:ext>
+              </a:extLst>
+            </p:cNvPr>
+            <p:cNvSpPr/>
+            <p:nvPr/>
+          </p:nvSpPr>
+          <p:spPr>
+            <a:xfrm rot="13500000">
+              <a:off x="3003209" y="4324177"/>
+              <a:ext cx="721659" cy="264160"/>
+            </a:xfrm>
+            <a:prstGeom prst="ellipse">
+              <a:avLst/>
+            </a:prstGeom>
+            <a:noFill/>
+            <a:ln w="19050"/>
+          </p:spPr>
+          <p:style>
+            <a:lnRef idx="2">
+              <a:schemeClr val="accent1">
+                <a:shade val="15000"/>
+              </a:schemeClr>
+            </a:lnRef>
+            <a:fillRef idx="1">
+              <a:schemeClr val="accent1"/>
+            </a:fillRef>
+            <a:effectRef idx="0">
+              <a:schemeClr val="accent1"/>
+            </a:effectRef>
+            <a:fontRef idx="minor">
+              <a:schemeClr val="lt1"/>
+            </a:fontRef>
+          </p:style>
+          <p:txBody>
+            <a:bodyPr rtlCol="0" anchor="ctr"/>
+            <a:lstStyle/>
+            <a:p>
+              <a:pPr algn="ctr"/>
+              <a:endParaRPr lang="en-ID" dirty="0"/>
+            </a:p>
+          </p:txBody>
+        </p:sp>
       </p:grpSp>
     </p:spTree>
     <p:extLst>
@@ -20415,1283 +20406,1263 @@
           <a:chExt cx="0" cy="0"/>
         </a:xfrm>
       </p:grpSpPr>
-      <p:grpSp>
-        <p:nvGrpSpPr>
-          <p:cNvPr id="11" name="Group 10">
+      <p:sp>
+        <p:nvSpPr>
+          <p:cNvPr id="5" name="Trapezoid 4">
             <a:extLst>
               <a:ext uri="{FF2B5EF4-FFF2-40B4-BE49-F238E27FC236}">
-                <a16:creationId xmlns:a16="http://schemas.microsoft.com/office/drawing/2014/main" id="{75441D11-7D82-FE96-D2D5-D201D0C269F4}"/>
+                <a16:creationId xmlns:a16="http://schemas.microsoft.com/office/drawing/2014/main" id="{C1B3A237-35D5-48A0-2A4A-EA76428EF63C}"/>
               </a:ext>
             </a:extLst>
           </p:cNvPr>
-          <p:cNvGrpSpPr/>
+          <p:cNvSpPr/>
           <p:nvPr/>
-        </p:nvGrpSpPr>
-        <p:grpSpPr>
+        </p:nvSpPr>
+        <p:spPr>
+          <a:xfrm flipV="1">
+            <a:off x="4296000" y="1488440"/>
+            <a:ext cx="1080000" cy="580068"/>
+          </a:xfrm>
+          <a:prstGeom prst="trapezoid">
+            <a:avLst/>
+          </a:prstGeom>
+          <a:solidFill>
+            <a:schemeClr val="tx1">
+              <a:lumMod val="85000"/>
+              <a:lumOff val="15000"/>
+            </a:schemeClr>
+          </a:solidFill>
+          <a:ln>
+            <a:noFill/>
+          </a:ln>
+        </p:spPr>
+        <p:style>
+          <a:lnRef idx="2">
+            <a:schemeClr val="accent1">
+              <a:shade val="15000"/>
+            </a:schemeClr>
+          </a:lnRef>
+          <a:fillRef idx="1">
+            <a:schemeClr val="accent1"/>
+          </a:fillRef>
+          <a:effectRef idx="0">
+            <a:schemeClr val="accent1"/>
+          </a:effectRef>
+          <a:fontRef idx="minor">
+            <a:schemeClr val="lt1"/>
+          </a:fontRef>
+        </p:style>
+        <p:txBody>
+          <a:bodyPr rtlCol="0" anchor="ctr"/>
+          <a:lstStyle/>
+          <a:p>
+            <a:pPr algn="ctr"/>
+            <a:endParaRPr lang="en-ID"/>
+          </a:p>
+        </p:txBody>
+      </p:sp>
+      <p:sp>
+        <p:nvSpPr>
+          <p:cNvPr id="12" name="Rectangle 11">
+            <a:extLst>
+              <a:ext uri="{FF2B5EF4-FFF2-40B4-BE49-F238E27FC236}">
+                <a16:creationId xmlns:a16="http://schemas.microsoft.com/office/drawing/2014/main" id="{E4961E39-A69B-78CC-280B-26CB5DB6C373}"/>
+              </a:ext>
+            </a:extLst>
+          </p:cNvPr>
+          <p:cNvSpPr/>
+          <p:nvPr/>
+        </p:nvSpPr>
+        <p:spPr>
           <a:xfrm>
-            <a:off x="4296000" y="1488440"/>
-            <a:ext cx="3600000" cy="2162282"/>
-            <a:chOff x="4296000" y="1488440"/>
-            <a:chExt cx="3600000" cy="2162282"/>
+            <a:off x="5376000" y="2210722"/>
+            <a:ext cx="1440000" cy="720000"/>
           </a:xfrm>
-        </p:grpSpPr>
-        <p:sp>
-          <p:nvSpPr>
-            <p:cNvPr id="5" name="Trapezoid 4">
-              <a:extLst>
-                <a:ext uri="{FF2B5EF4-FFF2-40B4-BE49-F238E27FC236}">
-                  <a16:creationId xmlns:a16="http://schemas.microsoft.com/office/drawing/2014/main" id="{C1B3A237-35D5-48A0-2A4A-EA76428EF63C}"/>
-                </a:ext>
-              </a:extLst>
-            </p:cNvPr>
-            <p:cNvSpPr/>
-            <p:nvPr/>
-          </p:nvSpPr>
-          <p:spPr>
-            <a:xfrm flipV="1">
-              <a:off x="4296000" y="1488440"/>
-              <a:ext cx="1080000" cy="580068"/>
-            </a:xfrm>
-            <a:prstGeom prst="trapezoid">
-              <a:avLst/>
-            </a:prstGeom>
-            <a:solidFill>
-              <a:schemeClr val="tx1">
-                <a:lumMod val="85000"/>
-                <a:lumOff val="15000"/>
-              </a:schemeClr>
-            </a:solidFill>
-            <a:ln>
-              <a:noFill/>
-            </a:ln>
-          </p:spPr>
-          <p:style>
-            <a:lnRef idx="2">
-              <a:schemeClr val="accent1">
-                <a:shade val="15000"/>
-              </a:schemeClr>
-            </a:lnRef>
-            <a:fillRef idx="1">
-              <a:schemeClr val="accent1"/>
-            </a:fillRef>
-            <a:effectRef idx="0">
-              <a:schemeClr val="accent1"/>
-            </a:effectRef>
-            <a:fontRef idx="minor">
-              <a:schemeClr val="lt1"/>
-            </a:fontRef>
-          </p:style>
-          <p:txBody>
-            <a:bodyPr rtlCol="0" anchor="ctr"/>
-            <a:lstStyle/>
-            <a:p>
-              <a:pPr algn="ctr"/>
-              <a:endParaRPr lang="en-ID"/>
-            </a:p>
-          </p:txBody>
-        </p:sp>
-        <p:sp>
-          <p:nvSpPr>
-            <p:cNvPr id="12" name="Rectangle 11">
-              <a:extLst>
-                <a:ext uri="{FF2B5EF4-FFF2-40B4-BE49-F238E27FC236}">
-                  <a16:creationId xmlns:a16="http://schemas.microsoft.com/office/drawing/2014/main" id="{E4961E39-A69B-78CC-280B-26CB5DB6C373}"/>
-                </a:ext>
-              </a:extLst>
-            </p:cNvPr>
-            <p:cNvSpPr/>
-            <p:nvPr/>
-          </p:nvSpPr>
-          <p:spPr>
-            <a:xfrm>
-              <a:off x="5376000" y="2210722"/>
-              <a:ext cx="1440000" cy="720000"/>
-            </a:xfrm>
-            <a:prstGeom prst="rect">
-              <a:avLst/>
-            </a:prstGeom>
-            <a:solidFill>
-              <a:schemeClr val="bg2"/>
-            </a:solidFill>
-            <a:ln>
-              <a:solidFill>
-                <a:schemeClr val="bg2">
-                  <a:lumMod val="50000"/>
-                </a:schemeClr>
-              </a:solidFill>
-            </a:ln>
-          </p:spPr>
-          <p:style>
-            <a:lnRef idx="2">
-              <a:schemeClr val="accent1">
-                <a:shade val="15000"/>
-              </a:schemeClr>
-            </a:lnRef>
-            <a:fillRef idx="1">
-              <a:schemeClr val="accent1"/>
-            </a:fillRef>
-            <a:effectRef idx="0">
-              <a:schemeClr val="accent1"/>
-            </a:effectRef>
-            <a:fontRef idx="minor">
-              <a:schemeClr val="lt1"/>
-            </a:fontRef>
-          </p:style>
-          <p:txBody>
-            <a:bodyPr rtlCol="0" anchor="ctr"/>
-            <a:lstStyle/>
-            <a:p>
-              <a:pPr algn="ctr"/>
-              <a:endParaRPr lang="en-ID" dirty="0"/>
-            </a:p>
-          </p:txBody>
-        </p:sp>
-        <p:sp>
-          <p:nvSpPr>
-            <p:cNvPr id="7" name="Freeform: Shape 6">
-              <a:extLst>
-                <a:ext uri="{FF2B5EF4-FFF2-40B4-BE49-F238E27FC236}">
-                  <a16:creationId xmlns:a16="http://schemas.microsoft.com/office/drawing/2014/main" id="{843C0A2F-047D-4C65-96F5-DDABF04F4EA6}"/>
-                </a:ext>
-              </a:extLst>
-            </p:cNvPr>
-            <p:cNvSpPr/>
-            <p:nvPr/>
-          </p:nvSpPr>
-          <p:spPr>
-            <a:xfrm>
-              <a:off x="4673341" y="2067414"/>
-              <a:ext cx="702656" cy="646617"/>
-            </a:xfrm>
-            <a:custGeom>
-              <a:avLst/>
-              <a:gdLst>
-                <a:gd name="csX0" fmla="*/ 1 w 702656"/>
-                <a:gd name="csY0" fmla="*/ 0 h 646617"/>
-                <a:gd name="csX1" fmla="*/ 325316 w 702656"/>
-                <a:gd name="csY1" fmla="*/ 0 h 646617"/>
-                <a:gd name="csX2" fmla="*/ 325316 w 702656"/>
-                <a:gd name="csY2" fmla="*/ 360000 h 646617"/>
-                <a:gd name="csX3" fmla="*/ 702656 w 702656"/>
-                <a:gd name="csY3" fmla="*/ 360000 h 646617"/>
-                <a:gd name="csX4" fmla="*/ 702656 w 702656"/>
-                <a:gd name="csY4" fmla="*/ 646617 h 646617"/>
-                <a:gd name="csX5" fmla="*/ 0 w 702656"/>
-                <a:gd name="csY5" fmla="*/ 646617 h 646617"/>
-                <a:gd name="csX6" fmla="*/ 0 w 702656"/>
-                <a:gd name="csY6" fmla="*/ 360000 h 646617"/>
-                <a:gd name="csX7" fmla="*/ 1 w 702656"/>
-                <a:gd name="csY7" fmla="*/ 360000 h 646617"/>
-              </a:gdLst>
-              <a:ahLst/>
-              <a:cxnLst>
-                <a:cxn ang="0">
-                  <a:pos x="csX0" y="csY0"/>
-                </a:cxn>
-                <a:cxn ang="0">
-                  <a:pos x="csX1" y="csY1"/>
-                </a:cxn>
-                <a:cxn ang="0">
-                  <a:pos x="csX2" y="csY2"/>
-                </a:cxn>
-                <a:cxn ang="0">
-                  <a:pos x="csX3" y="csY3"/>
-                </a:cxn>
-                <a:cxn ang="0">
-                  <a:pos x="csX4" y="csY4"/>
-                </a:cxn>
-                <a:cxn ang="0">
-                  <a:pos x="csX5" y="csY5"/>
-                </a:cxn>
-                <a:cxn ang="0">
-                  <a:pos x="csX6" y="csY6"/>
-                </a:cxn>
-                <a:cxn ang="0">
-                  <a:pos x="csX7" y="csY7"/>
-                </a:cxn>
-              </a:cxnLst>
-              <a:rect l="l" t="t" r="r" b="b"/>
-              <a:pathLst>
-                <a:path w="702656" h="646617">
-                  <a:moveTo>
-                    <a:pt x="1" y="0"/>
-                  </a:moveTo>
-                  <a:lnTo>
-                    <a:pt x="325316" y="0"/>
-                  </a:lnTo>
-                  <a:lnTo>
-                    <a:pt x="325316" y="360000"/>
-                  </a:lnTo>
-                  <a:lnTo>
-                    <a:pt x="702656" y="360000"/>
-                  </a:lnTo>
-                  <a:lnTo>
-                    <a:pt x="702656" y="646617"/>
-                  </a:lnTo>
-                  <a:lnTo>
-                    <a:pt x="0" y="646617"/>
-                  </a:lnTo>
-                  <a:lnTo>
-                    <a:pt x="0" y="360000"/>
-                  </a:lnTo>
-                  <a:lnTo>
-                    <a:pt x="1" y="360000"/>
-                  </a:lnTo>
-                  <a:close/>
-                </a:path>
-              </a:pathLst>
-            </a:custGeom>
-            <a:solidFill>
-              <a:schemeClr val="bg2">
-                <a:lumMod val="50000"/>
-              </a:schemeClr>
-            </a:solidFill>
-            <a:ln>
-              <a:solidFill>
-                <a:schemeClr val="tx1">
-                  <a:lumMod val="75000"/>
-                  <a:lumOff val="25000"/>
-                </a:schemeClr>
-              </a:solidFill>
-            </a:ln>
-          </p:spPr>
-          <p:style>
-            <a:lnRef idx="2">
-              <a:schemeClr val="accent1">
-                <a:shade val="15000"/>
-              </a:schemeClr>
-            </a:lnRef>
-            <a:fillRef idx="1">
-              <a:schemeClr val="accent1"/>
-            </a:fillRef>
-            <a:effectRef idx="0">
-              <a:schemeClr val="accent1"/>
-            </a:effectRef>
-            <a:fontRef idx="minor">
-              <a:schemeClr val="lt1"/>
-            </a:fontRef>
-          </p:style>
-          <p:txBody>
-            <a:bodyPr wrap="square" rtlCol="0" anchor="ctr">
-              <a:noAutofit/>
-            </a:bodyPr>
-            <a:lstStyle/>
-            <a:p>
-              <a:pPr algn="ctr"/>
-              <a:endParaRPr lang="en-ID"/>
-            </a:p>
-          </p:txBody>
-        </p:sp>
-        <p:sp>
-          <p:nvSpPr>
-            <p:cNvPr id="13" name="Rectangle 12">
-              <a:extLst>
-                <a:ext uri="{FF2B5EF4-FFF2-40B4-BE49-F238E27FC236}">
-                  <a16:creationId xmlns:a16="http://schemas.microsoft.com/office/drawing/2014/main" id="{99CBF815-0F7F-BD7A-57E2-D559B8109235}"/>
-                </a:ext>
-              </a:extLst>
-            </p:cNvPr>
-            <p:cNvSpPr/>
-            <p:nvPr/>
-          </p:nvSpPr>
-          <p:spPr>
-            <a:xfrm rot="16200000">
-              <a:off x="5114552" y="2547862"/>
-              <a:ext cx="286619" cy="45719"/>
-            </a:xfrm>
-            <a:prstGeom prst="rect">
-              <a:avLst/>
-            </a:prstGeom>
+          <a:prstGeom prst="rect">
+            <a:avLst/>
+          </a:prstGeom>
+          <a:solidFill>
+            <a:schemeClr val="bg2"/>
+          </a:solidFill>
+          <a:ln w="28575">
             <a:solidFill>
               <a:schemeClr val="tx1">
                 <a:lumMod val="75000"/>
                 <a:lumOff val="25000"/>
               </a:schemeClr>
             </a:solidFill>
-            <a:ln>
-              <a:solidFill>
-                <a:schemeClr val="tx1">
-                  <a:lumMod val="75000"/>
-                  <a:lumOff val="25000"/>
-                </a:schemeClr>
-              </a:solidFill>
-            </a:ln>
-          </p:spPr>
-          <p:style>
-            <a:lnRef idx="2">
-              <a:schemeClr val="accent1">
-                <a:shade val="15000"/>
-              </a:schemeClr>
-            </a:lnRef>
-            <a:fillRef idx="1">
-              <a:schemeClr val="accent1"/>
-            </a:fillRef>
-            <a:effectRef idx="0">
-              <a:schemeClr val="accent1"/>
-            </a:effectRef>
-            <a:fontRef idx="minor">
-              <a:schemeClr val="lt1"/>
-            </a:fontRef>
-          </p:style>
-          <p:txBody>
-            <a:bodyPr rtlCol="0" anchor="ctr"/>
-            <a:lstStyle/>
-            <a:p>
-              <a:pPr algn="ctr"/>
-              <a:endParaRPr lang="en-ID"/>
-            </a:p>
-          </p:txBody>
-        </p:sp>
-        <p:sp>
-          <p:nvSpPr>
-            <p:cNvPr id="14" name="Rectangle 13">
-              <a:extLst>
-                <a:ext uri="{FF2B5EF4-FFF2-40B4-BE49-F238E27FC236}">
-                  <a16:creationId xmlns:a16="http://schemas.microsoft.com/office/drawing/2014/main" id="{D2B21206-3CE6-7F43-4FE3-4313DBB5DEF5}"/>
-                </a:ext>
-              </a:extLst>
-            </p:cNvPr>
-            <p:cNvSpPr/>
-            <p:nvPr/>
-          </p:nvSpPr>
-          <p:spPr>
-            <a:xfrm rot="16200000">
-              <a:off x="4967757" y="2547862"/>
-              <a:ext cx="286619" cy="45719"/>
-            </a:xfrm>
-            <a:prstGeom prst="rect">
-              <a:avLst/>
-            </a:prstGeom>
+          </a:ln>
+        </p:spPr>
+        <p:style>
+          <a:lnRef idx="2">
+            <a:schemeClr val="accent1">
+              <a:shade val="15000"/>
+            </a:schemeClr>
+          </a:lnRef>
+          <a:fillRef idx="1">
+            <a:schemeClr val="accent1"/>
+          </a:fillRef>
+          <a:effectRef idx="0">
+            <a:schemeClr val="accent1"/>
+          </a:effectRef>
+          <a:fontRef idx="minor">
+            <a:schemeClr val="lt1"/>
+          </a:fontRef>
+        </p:style>
+        <p:txBody>
+          <a:bodyPr rtlCol="0" anchor="ctr"/>
+          <a:lstStyle/>
+          <a:p>
+            <a:pPr algn="ctr"/>
+            <a:endParaRPr lang="en-ID" dirty="0"/>
+          </a:p>
+        </p:txBody>
+      </p:sp>
+      <p:sp>
+        <p:nvSpPr>
+          <p:cNvPr id="7" name="Freeform: Shape 6">
+            <a:extLst>
+              <a:ext uri="{FF2B5EF4-FFF2-40B4-BE49-F238E27FC236}">
+                <a16:creationId xmlns:a16="http://schemas.microsoft.com/office/drawing/2014/main" id="{843C0A2F-047D-4C65-96F5-DDABF04F4EA6}"/>
+              </a:ext>
+            </a:extLst>
+          </p:cNvPr>
+          <p:cNvSpPr/>
+          <p:nvPr/>
+        </p:nvSpPr>
+        <p:spPr>
+          <a:xfrm>
+            <a:off x="4673341" y="2067414"/>
+            <a:ext cx="702656" cy="646617"/>
+          </a:xfrm>
+          <a:custGeom>
+            <a:avLst/>
+            <a:gdLst>
+              <a:gd name="csX0" fmla="*/ 1 w 702656"/>
+              <a:gd name="csY0" fmla="*/ 0 h 646617"/>
+              <a:gd name="csX1" fmla="*/ 325316 w 702656"/>
+              <a:gd name="csY1" fmla="*/ 0 h 646617"/>
+              <a:gd name="csX2" fmla="*/ 325316 w 702656"/>
+              <a:gd name="csY2" fmla="*/ 360000 h 646617"/>
+              <a:gd name="csX3" fmla="*/ 702656 w 702656"/>
+              <a:gd name="csY3" fmla="*/ 360000 h 646617"/>
+              <a:gd name="csX4" fmla="*/ 702656 w 702656"/>
+              <a:gd name="csY4" fmla="*/ 646617 h 646617"/>
+              <a:gd name="csX5" fmla="*/ 0 w 702656"/>
+              <a:gd name="csY5" fmla="*/ 646617 h 646617"/>
+              <a:gd name="csX6" fmla="*/ 0 w 702656"/>
+              <a:gd name="csY6" fmla="*/ 360000 h 646617"/>
+              <a:gd name="csX7" fmla="*/ 1 w 702656"/>
+              <a:gd name="csY7" fmla="*/ 360000 h 646617"/>
+            </a:gdLst>
+            <a:ahLst/>
+            <a:cxnLst>
+              <a:cxn ang="0">
+                <a:pos x="csX0" y="csY0"/>
+              </a:cxn>
+              <a:cxn ang="0">
+                <a:pos x="csX1" y="csY1"/>
+              </a:cxn>
+              <a:cxn ang="0">
+                <a:pos x="csX2" y="csY2"/>
+              </a:cxn>
+              <a:cxn ang="0">
+                <a:pos x="csX3" y="csY3"/>
+              </a:cxn>
+              <a:cxn ang="0">
+                <a:pos x="csX4" y="csY4"/>
+              </a:cxn>
+              <a:cxn ang="0">
+                <a:pos x="csX5" y="csY5"/>
+              </a:cxn>
+              <a:cxn ang="0">
+                <a:pos x="csX6" y="csY6"/>
+              </a:cxn>
+              <a:cxn ang="0">
+                <a:pos x="csX7" y="csY7"/>
+              </a:cxn>
+            </a:cxnLst>
+            <a:rect l="l" t="t" r="r" b="b"/>
+            <a:pathLst>
+              <a:path w="702656" h="646617">
+                <a:moveTo>
+                  <a:pt x="1" y="0"/>
+                </a:moveTo>
+                <a:lnTo>
+                  <a:pt x="325316" y="0"/>
+                </a:lnTo>
+                <a:lnTo>
+                  <a:pt x="325316" y="360000"/>
+                </a:lnTo>
+                <a:lnTo>
+                  <a:pt x="702656" y="360000"/>
+                </a:lnTo>
+                <a:lnTo>
+                  <a:pt x="702656" y="646617"/>
+                </a:lnTo>
+                <a:lnTo>
+                  <a:pt x="0" y="646617"/>
+                </a:lnTo>
+                <a:lnTo>
+                  <a:pt x="0" y="360000"/>
+                </a:lnTo>
+                <a:lnTo>
+                  <a:pt x="1" y="360000"/>
+                </a:lnTo>
+                <a:close/>
+              </a:path>
+            </a:pathLst>
+          </a:custGeom>
+          <a:solidFill>
+            <a:schemeClr val="bg2">
+              <a:lumMod val="50000"/>
+            </a:schemeClr>
+          </a:solidFill>
+          <a:ln>
             <a:solidFill>
               <a:schemeClr val="tx1">
                 <a:lumMod val="75000"/>
                 <a:lumOff val="25000"/>
               </a:schemeClr>
             </a:solidFill>
-            <a:ln>
-              <a:solidFill>
-                <a:schemeClr val="tx1">
-                  <a:lumMod val="75000"/>
-                  <a:lumOff val="25000"/>
-                </a:schemeClr>
-              </a:solidFill>
-            </a:ln>
-          </p:spPr>
-          <p:style>
-            <a:lnRef idx="2">
-              <a:schemeClr val="accent1">
-                <a:shade val="15000"/>
-              </a:schemeClr>
-            </a:lnRef>
-            <a:fillRef idx="1">
-              <a:schemeClr val="accent1"/>
-            </a:fillRef>
-            <a:effectRef idx="0">
-              <a:schemeClr val="accent1"/>
-            </a:effectRef>
-            <a:fontRef idx="minor">
-              <a:schemeClr val="lt1"/>
-            </a:fontRef>
-          </p:style>
-          <p:txBody>
-            <a:bodyPr rtlCol="0" anchor="ctr"/>
-            <a:lstStyle/>
-            <a:p>
-              <a:pPr algn="ctr"/>
-              <a:endParaRPr lang="en-ID"/>
-            </a:p>
-          </p:txBody>
-        </p:sp>
-        <p:sp>
-          <p:nvSpPr>
-            <p:cNvPr id="9" name="Freeform: Shape 8">
-              <a:extLst>
-                <a:ext uri="{FF2B5EF4-FFF2-40B4-BE49-F238E27FC236}">
-                  <a16:creationId xmlns:a16="http://schemas.microsoft.com/office/drawing/2014/main" id="{EC05CBC1-47D7-2915-647B-25FFE814186F}"/>
-                </a:ext>
-              </a:extLst>
-            </p:cNvPr>
-            <p:cNvSpPr/>
-            <p:nvPr/>
-          </p:nvSpPr>
-          <p:spPr>
-            <a:xfrm>
-              <a:off x="6816737" y="2067412"/>
-              <a:ext cx="702658" cy="646618"/>
-            </a:xfrm>
-            <a:custGeom>
-              <a:avLst/>
-              <a:gdLst>
-                <a:gd name="csX0" fmla="*/ 377343 w 702658"/>
-                <a:gd name="csY0" fmla="*/ 0 h 646618"/>
-                <a:gd name="csX1" fmla="*/ 702658 w 702658"/>
-                <a:gd name="csY1" fmla="*/ 0 h 646618"/>
-                <a:gd name="csX2" fmla="*/ 702658 w 702658"/>
-                <a:gd name="csY2" fmla="*/ 504338 h 646618"/>
-                <a:gd name="csX3" fmla="*/ 702656 w 702658"/>
-                <a:gd name="csY3" fmla="*/ 504338 h 646618"/>
-                <a:gd name="csX4" fmla="*/ 702656 w 702658"/>
-                <a:gd name="csY4" fmla="*/ 646618 h 646618"/>
-                <a:gd name="csX5" fmla="*/ 0 w 702658"/>
-                <a:gd name="csY5" fmla="*/ 646618 h 646618"/>
-                <a:gd name="csX6" fmla="*/ 0 w 702658"/>
-                <a:gd name="csY6" fmla="*/ 360001 h 646618"/>
-                <a:gd name="csX7" fmla="*/ 377343 w 702658"/>
-                <a:gd name="csY7" fmla="*/ 360001 h 646618"/>
-              </a:gdLst>
-              <a:ahLst/>
-              <a:cxnLst>
-                <a:cxn ang="0">
-                  <a:pos x="csX0" y="csY0"/>
-                </a:cxn>
-                <a:cxn ang="0">
-                  <a:pos x="csX1" y="csY1"/>
-                </a:cxn>
-                <a:cxn ang="0">
-                  <a:pos x="csX2" y="csY2"/>
-                </a:cxn>
-                <a:cxn ang="0">
-                  <a:pos x="csX3" y="csY3"/>
-                </a:cxn>
-                <a:cxn ang="0">
-                  <a:pos x="csX4" y="csY4"/>
-                </a:cxn>
-                <a:cxn ang="0">
-                  <a:pos x="csX5" y="csY5"/>
-                </a:cxn>
-                <a:cxn ang="0">
-                  <a:pos x="csX6" y="csY6"/>
-                </a:cxn>
-                <a:cxn ang="0">
-                  <a:pos x="csX7" y="csY7"/>
-                </a:cxn>
-              </a:cxnLst>
-              <a:rect l="l" t="t" r="r" b="b"/>
-              <a:pathLst>
-                <a:path w="702658" h="646618">
-                  <a:moveTo>
-                    <a:pt x="377343" y="0"/>
-                  </a:moveTo>
-                  <a:lnTo>
-                    <a:pt x="702658" y="0"/>
-                  </a:lnTo>
-                  <a:lnTo>
-                    <a:pt x="702658" y="504338"/>
-                  </a:lnTo>
-                  <a:lnTo>
-                    <a:pt x="702656" y="504338"/>
-                  </a:lnTo>
-                  <a:lnTo>
-                    <a:pt x="702656" y="646618"/>
-                  </a:lnTo>
-                  <a:lnTo>
-                    <a:pt x="0" y="646618"/>
-                  </a:lnTo>
-                  <a:lnTo>
-                    <a:pt x="0" y="360001"/>
-                  </a:lnTo>
-                  <a:lnTo>
-                    <a:pt x="377343" y="360001"/>
-                  </a:lnTo>
-                  <a:close/>
-                </a:path>
-              </a:pathLst>
-            </a:custGeom>
-            <a:solidFill>
-              <a:schemeClr val="bg2">
-                <a:lumMod val="50000"/>
-              </a:schemeClr>
-            </a:solidFill>
-            <a:ln>
-              <a:solidFill>
-                <a:schemeClr val="tx1">
-                  <a:lumMod val="75000"/>
-                  <a:lumOff val="25000"/>
-                </a:schemeClr>
-              </a:solidFill>
-            </a:ln>
-          </p:spPr>
-          <p:style>
-            <a:lnRef idx="2">
-              <a:schemeClr val="accent1">
-                <a:shade val="15000"/>
-              </a:schemeClr>
-            </a:lnRef>
-            <a:fillRef idx="1">
-              <a:schemeClr val="accent1"/>
-            </a:fillRef>
-            <a:effectRef idx="0">
-              <a:schemeClr val="accent1"/>
-            </a:effectRef>
-            <a:fontRef idx="minor">
-              <a:schemeClr val="lt1"/>
-            </a:fontRef>
-          </p:style>
-          <p:txBody>
-            <a:bodyPr wrap="square" rtlCol="0" anchor="ctr">
-              <a:noAutofit/>
-            </a:bodyPr>
-            <a:lstStyle/>
-            <a:p>
-              <a:pPr algn="ctr"/>
-              <a:endParaRPr lang="en-ID"/>
-            </a:p>
-          </p:txBody>
-        </p:sp>
-        <p:sp>
-          <p:nvSpPr>
-            <p:cNvPr id="26" name="Rectangle 25">
-              <a:extLst>
-                <a:ext uri="{FF2B5EF4-FFF2-40B4-BE49-F238E27FC236}">
-                  <a16:creationId xmlns:a16="http://schemas.microsoft.com/office/drawing/2014/main" id="{F7109290-7B06-4B6C-756C-B14A1D666340}"/>
-                </a:ext>
-              </a:extLst>
-            </p:cNvPr>
-            <p:cNvSpPr/>
-            <p:nvPr/>
-          </p:nvSpPr>
-          <p:spPr>
-            <a:xfrm>
-              <a:off x="5933344" y="2930722"/>
-              <a:ext cx="325315" cy="360000"/>
-            </a:xfrm>
-            <a:prstGeom prst="rect">
-              <a:avLst/>
-            </a:prstGeom>
-            <a:solidFill>
-              <a:schemeClr val="bg2">
-                <a:lumMod val="50000"/>
-              </a:schemeClr>
-            </a:solidFill>
-            <a:ln>
-              <a:solidFill>
-                <a:schemeClr val="tx1">
-                  <a:lumMod val="75000"/>
-                  <a:lumOff val="25000"/>
-                </a:schemeClr>
-              </a:solidFill>
-            </a:ln>
-          </p:spPr>
-          <p:style>
-            <a:lnRef idx="2">
-              <a:schemeClr val="accent1">
-                <a:shade val="15000"/>
-              </a:schemeClr>
-            </a:lnRef>
-            <a:fillRef idx="1">
-              <a:schemeClr val="accent1"/>
-            </a:fillRef>
-            <a:effectRef idx="0">
-              <a:schemeClr val="accent1"/>
-            </a:effectRef>
-            <a:fontRef idx="minor">
-              <a:schemeClr val="lt1"/>
-            </a:fontRef>
-          </p:style>
-          <p:txBody>
-            <a:bodyPr rtlCol="0" anchor="ctr"/>
-            <a:lstStyle/>
-            <a:p>
-              <a:pPr algn="ctr"/>
-              <a:endParaRPr lang="en-ID"/>
-            </a:p>
-          </p:txBody>
-        </p:sp>
-        <p:sp>
-          <p:nvSpPr>
-            <p:cNvPr id="27" name="Rectangle 26">
-              <a:extLst>
-                <a:ext uri="{FF2B5EF4-FFF2-40B4-BE49-F238E27FC236}">
-                  <a16:creationId xmlns:a16="http://schemas.microsoft.com/office/drawing/2014/main" id="{88705CEE-4C6E-2169-2732-51104412934A}"/>
-                </a:ext>
-              </a:extLst>
-            </p:cNvPr>
-            <p:cNvSpPr/>
-            <p:nvPr/>
-          </p:nvSpPr>
-          <p:spPr>
-            <a:xfrm>
-              <a:off x="5933342" y="2999448"/>
-              <a:ext cx="325315" cy="45719"/>
-            </a:xfrm>
-            <a:prstGeom prst="rect">
-              <a:avLst/>
-            </a:prstGeom>
+          </a:ln>
+        </p:spPr>
+        <p:style>
+          <a:lnRef idx="2">
+            <a:schemeClr val="accent1">
+              <a:shade val="15000"/>
+            </a:schemeClr>
+          </a:lnRef>
+          <a:fillRef idx="1">
+            <a:schemeClr val="accent1"/>
+          </a:fillRef>
+          <a:effectRef idx="0">
+            <a:schemeClr val="accent1"/>
+          </a:effectRef>
+          <a:fontRef idx="minor">
+            <a:schemeClr val="lt1"/>
+          </a:fontRef>
+        </p:style>
+        <p:txBody>
+          <a:bodyPr wrap="square" rtlCol="0" anchor="ctr">
+            <a:noAutofit/>
+          </a:bodyPr>
+          <a:lstStyle/>
+          <a:p>
+            <a:pPr algn="ctr"/>
+            <a:endParaRPr lang="en-ID"/>
+          </a:p>
+        </p:txBody>
+      </p:sp>
+      <p:sp>
+        <p:nvSpPr>
+          <p:cNvPr id="13" name="Rectangle 12">
+            <a:extLst>
+              <a:ext uri="{FF2B5EF4-FFF2-40B4-BE49-F238E27FC236}">
+                <a16:creationId xmlns:a16="http://schemas.microsoft.com/office/drawing/2014/main" id="{99CBF815-0F7F-BD7A-57E2-D559B8109235}"/>
+              </a:ext>
+            </a:extLst>
+          </p:cNvPr>
+          <p:cNvSpPr/>
+          <p:nvPr/>
+        </p:nvSpPr>
+        <p:spPr>
+          <a:xfrm rot="16200000">
+            <a:off x="5114552" y="2547862"/>
+            <a:ext cx="286619" cy="45719"/>
+          </a:xfrm>
+          <a:prstGeom prst="rect">
+            <a:avLst/>
+          </a:prstGeom>
+          <a:solidFill>
+            <a:schemeClr val="tx1">
+              <a:lumMod val="75000"/>
+              <a:lumOff val="25000"/>
+            </a:schemeClr>
+          </a:solidFill>
+          <a:ln>
             <a:solidFill>
               <a:schemeClr val="tx1">
                 <a:lumMod val="75000"/>
                 <a:lumOff val="25000"/>
               </a:schemeClr>
             </a:solidFill>
-            <a:ln>
-              <a:solidFill>
-                <a:schemeClr val="tx1">
-                  <a:lumMod val="75000"/>
-                  <a:lumOff val="25000"/>
-                </a:schemeClr>
-              </a:solidFill>
-            </a:ln>
-          </p:spPr>
-          <p:style>
-            <a:lnRef idx="2">
-              <a:schemeClr val="accent1">
-                <a:shade val="15000"/>
-              </a:schemeClr>
-            </a:lnRef>
-            <a:fillRef idx="1">
-              <a:schemeClr val="accent1"/>
-            </a:fillRef>
-            <a:effectRef idx="0">
-              <a:schemeClr val="accent1"/>
-            </a:effectRef>
-            <a:fontRef idx="minor">
-              <a:schemeClr val="lt1"/>
-            </a:fontRef>
-          </p:style>
-          <p:txBody>
-            <a:bodyPr rtlCol="0" anchor="ctr"/>
-            <a:lstStyle/>
-            <a:p>
-              <a:pPr algn="ctr"/>
-              <a:endParaRPr lang="en-ID"/>
-            </a:p>
-          </p:txBody>
-        </p:sp>
-        <p:sp>
-          <p:nvSpPr>
-            <p:cNvPr id="28" name="Rectangle 27">
-              <a:extLst>
-                <a:ext uri="{FF2B5EF4-FFF2-40B4-BE49-F238E27FC236}">
-                  <a16:creationId xmlns:a16="http://schemas.microsoft.com/office/drawing/2014/main" id="{3F6F0C89-45D3-7A46-9287-D75EFD323244}"/>
-                </a:ext>
-              </a:extLst>
-            </p:cNvPr>
-            <p:cNvSpPr/>
-            <p:nvPr/>
-          </p:nvSpPr>
-          <p:spPr>
-            <a:xfrm>
-              <a:off x="5933342" y="3154511"/>
-              <a:ext cx="325315" cy="45719"/>
-            </a:xfrm>
-            <a:prstGeom prst="rect">
-              <a:avLst/>
-            </a:prstGeom>
+          </a:ln>
+        </p:spPr>
+        <p:style>
+          <a:lnRef idx="2">
+            <a:schemeClr val="accent1">
+              <a:shade val="15000"/>
+            </a:schemeClr>
+          </a:lnRef>
+          <a:fillRef idx="1">
+            <a:schemeClr val="accent1"/>
+          </a:fillRef>
+          <a:effectRef idx="0">
+            <a:schemeClr val="accent1"/>
+          </a:effectRef>
+          <a:fontRef idx="minor">
+            <a:schemeClr val="lt1"/>
+          </a:fontRef>
+        </p:style>
+        <p:txBody>
+          <a:bodyPr rtlCol="0" anchor="ctr"/>
+          <a:lstStyle/>
+          <a:p>
+            <a:pPr algn="ctr"/>
+            <a:endParaRPr lang="en-ID"/>
+          </a:p>
+        </p:txBody>
+      </p:sp>
+      <p:sp>
+        <p:nvSpPr>
+          <p:cNvPr id="14" name="Rectangle 13">
+            <a:extLst>
+              <a:ext uri="{FF2B5EF4-FFF2-40B4-BE49-F238E27FC236}">
+                <a16:creationId xmlns:a16="http://schemas.microsoft.com/office/drawing/2014/main" id="{D2B21206-3CE6-7F43-4FE3-4313DBB5DEF5}"/>
+              </a:ext>
+            </a:extLst>
+          </p:cNvPr>
+          <p:cNvSpPr/>
+          <p:nvPr/>
+        </p:nvSpPr>
+        <p:spPr>
+          <a:xfrm rot="16200000">
+            <a:off x="4967757" y="2547862"/>
+            <a:ext cx="286619" cy="45719"/>
+          </a:xfrm>
+          <a:prstGeom prst="rect">
+            <a:avLst/>
+          </a:prstGeom>
+          <a:solidFill>
+            <a:schemeClr val="tx1">
+              <a:lumMod val="75000"/>
+              <a:lumOff val="25000"/>
+            </a:schemeClr>
+          </a:solidFill>
+          <a:ln>
             <a:solidFill>
               <a:schemeClr val="tx1">
                 <a:lumMod val="75000"/>
                 <a:lumOff val="25000"/>
               </a:schemeClr>
             </a:solidFill>
-            <a:ln>
-              <a:solidFill>
-                <a:schemeClr val="tx1">
-                  <a:lumMod val="75000"/>
-                  <a:lumOff val="25000"/>
-                </a:schemeClr>
-              </a:solidFill>
-            </a:ln>
-          </p:spPr>
-          <p:style>
-            <a:lnRef idx="2">
-              <a:schemeClr val="accent1">
-                <a:shade val="15000"/>
-              </a:schemeClr>
-            </a:lnRef>
-            <a:fillRef idx="1">
-              <a:schemeClr val="accent1"/>
-            </a:fillRef>
-            <a:effectRef idx="0">
-              <a:schemeClr val="accent1"/>
-            </a:effectRef>
-            <a:fontRef idx="minor">
-              <a:schemeClr val="lt1"/>
-            </a:fontRef>
-          </p:style>
-          <p:txBody>
-            <a:bodyPr rtlCol="0" anchor="ctr"/>
-            <a:lstStyle/>
-            <a:p>
-              <a:pPr algn="ctr"/>
-              <a:endParaRPr lang="en-ID"/>
-            </a:p>
-          </p:txBody>
-        </p:sp>
-        <p:sp>
-          <p:nvSpPr>
-            <p:cNvPr id="35" name="Rectangle 34">
-              <a:extLst>
-                <a:ext uri="{FF2B5EF4-FFF2-40B4-BE49-F238E27FC236}">
-                  <a16:creationId xmlns:a16="http://schemas.microsoft.com/office/drawing/2014/main" id="{FF20CA1C-4C86-F1DD-3899-7F7B98A20855}"/>
-                </a:ext>
-              </a:extLst>
-            </p:cNvPr>
-            <p:cNvSpPr/>
-            <p:nvPr/>
-          </p:nvSpPr>
-          <p:spPr>
-            <a:xfrm rot="5400000" flipH="1">
-              <a:off x="6791564" y="2547861"/>
-              <a:ext cx="286619" cy="45719"/>
-            </a:xfrm>
-            <a:prstGeom prst="rect">
-              <a:avLst/>
-            </a:prstGeom>
+          </a:ln>
+        </p:spPr>
+        <p:style>
+          <a:lnRef idx="2">
+            <a:schemeClr val="accent1">
+              <a:shade val="15000"/>
+            </a:schemeClr>
+          </a:lnRef>
+          <a:fillRef idx="1">
+            <a:schemeClr val="accent1"/>
+          </a:fillRef>
+          <a:effectRef idx="0">
+            <a:schemeClr val="accent1"/>
+          </a:effectRef>
+          <a:fontRef idx="minor">
+            <a:schemeClr val="lt1"/>
+          </a:fontRef>
+        </p:style>
+        <p:txBody>
+          <a:bodyPr rtlCol="0" anchor="ctr"/>
+          <a:lstStyle/>
+          <a:p>
+            <a:pPr algn="ctr"/>
+            <a:endParaRPr lang="en-ID"/>
+          </a:p>
+        </p:txBody>
+      </p:sp>
+      <p:sp>
+        <p:nvSpPr>
+          <p:cNvPr id="9" name="Freeform: Shape 8">
+            <a:extLst>
+              <a:ext uri="{FF2B5EF4-FFF2-40B4-BE49-F238E27FC236}">
+                <a16:creationId xmlns:a16="http://schemas.microsoft.com/office/drawing/2014/main" id="{EC05CBC1-47D7-2915-647B-25FFE814186F}"/>
+              </a:ext>
+            </a:extLst>
+          </p:cNvPr>
+          <p:cNvSpPr/>
+          <p:nvPr/>
+        </p:nvSpPr>
+        <p:spPr>
+          <a:xfrm>
+            <a:off x="6816737" y="2067412"/>
+            <a:ext cx="702658" cy="646618"/>
+          </a:xfrm>
+          <a:custGeom>
+            <a:avLst/>
+            <a:gdLst>
+              <a:gd name="csX0" fmla="*/ 377343 w 702658"/>
+              <a:gd name="csY0" fmla="*/ 0 h 646618"/>
+              <a:gd name="csX1" fmla="*/ 702658 w 702658"/>
+              <a:gd name="csY1" fmla="*/ 0 h 646618"/>
+              <a:gd name="csX2" fmla="*/ 702658 w 702658"/>
+              <a:gd name="csY2" fmla="*/ 504338 h 646618"/>
+              <a:gd name="csX3" fmla="*/ 702656 w 702658"/>
+              <a:gd name="csY3" fmla="*/ 504338 h 646618"/>
+              <a:gd name="csX4" fmla="*/ 702656 w 702658"/>
+              <a:gd name="csY4" fmla="*/ 646618 h 646618"/>
+              <a:gd name="csX5" fmla="*/ 0 w 702658"/>
+              <a:gd name="csY5" fmla="*/ 646618 h 646618"/>
+              <a:gd name="csX6" fmla="*/ 0 w 702658"/>
+              <a:gd name="csY6" fmla="*/ 360001 h 646618"/>
+              <a:gd name="csX7" fmla="*/ 377343 w 702658"/>
+              <a:gd name="csY7" fmla="*/ 360001 h 646618"/>
+            </a:gdLst>
+            <a:ahLst/>
+            <a:cxnLst>
+              <a:cxn ang="0">
+                <a:pos x="csX0" y="csY0"/>
+              </a:cxn>
+              <a:cxn ang="0">
+                <a:pos x="csX1" y="csY1"/>
+              </a:cxn>
+              <a:cxn ang="0">
+                <a:pos x="csX2" y="csY2"/>
+              </a:cxn>
+              <a:cxn ang="0">
+                <a:pos x="csX3" y="csY3"/>
+              </a:cxn>
+              <a:cxn ang="0">
+                <a:pos x="csX4" y="csY4"/>
+              </a:cxn>
+              <a:cxn ang="0">
+                <a:pos x="csX5" y="csY5"/>
+              </a:cxn>
+              <a:cxn ang="0">
+                <a:pos x="csX6" y="csY6"/>
+              </a:cxn>
+              <a:cxn ang="0">
+                <a:pos x="csX7" y="csY7"/>
+              </a:cxn>
+            </a:cxnLst>
+            <a:rect l="l" t="t" r="r" b="b"/>
+            <a:pathLst>
+              <a:path w="702658" h="646618">
+                <a:moveTo>
+                  <a:pt x="377343" y="0"/>
+                </a:moveTo>
+                <a:lnTo>
+                  <a:pt x="702658" y="0"/>
+                </a:lnTo>
+                <a:lnTo>
+                  <a:pt x="702658" y="504338"/>
+                </a:lnTo>
+                <a:lnTo>
+                  <a:pt x="702656" y="504338"/>
+                </a:lnTo>
+                <a:lnTo>
+                  <a:pt x="702656" y="646618"/>
+                </a:lnTo>
+                <a:lnTo>
+                  <a:pt x="0" y="646618"/>
+                </a:lnTo>
+                <a:lnTo>
+                  <a:pt x="0" y="360001"/>
+                </a:lnTo>
+                <a:lnTo>
+                  <a:pt x="377343" y="360001"/>
+                </a:lnTo>
+                <a:close/>
+              </a:path>
+            </a:pathLst>
+          </a:custGeom>
+          <a:solidFill>
+            <a:schemeClr val="bg2">
+              <a:lumMod val="50000"/>
+            </a:schemeClr>
+          </a:solidFill>
+          <a:ln>
             <a:solidFill>
               <a:schemeClr val="tx1">
                 <a:lumMod val="75000"/>
                 <a:lumOff val="25000"/>
               </a:schemeClr>
             </a:solidFill>
-            <a:ln>
-              <a:solidFill>
-                <a:schemeClr val="tx1">
-                  <a:lumMod val="75000"/>
-                  <a:lumOff val="25000"/>
-                </a:schemeClr>
-              </a:solidFill>
-            </a:ln>
-          </p:spPr>
-          <p:style>
-            <a:lnRef idx="2">
-              <a:schemeClr val="accent1">
-                <a:shade val="15000"/>
-              </a:schemeClr>
-            </a:lnRef>
-            <a:fillRef idx="1">
-              <a:schemeClr val="accent1"/>
-            </a:fillRef>
-            <a:effectRef idx="0">
-              <a:schemeClr val="accent1"/>
-            </a:effectRef>
-            <a:fontRef idx="minor">
-              <a:schemeClr val="lt1"/>
-            </a:fontRef>
-          </p:style>
-          <p:txBody>
-            <a:bodyPr rtlCol="0" anchor="ctr"/>
-            <a:lstStyle/>
-            <a:p>
-              <a:pPr algn="ctr"/>
-              <a:endParaRPr lang="en-ID"/>
-            </a:p>
-          </p:txBody>
-        </p:sp>
-        <p:sp>
-          <p:nvSpPr>
-            <p:cNvPr id="36" name="Rectangle 35">
-              <a:extLst>
-                <a:ext uri="{FF2B5EF4-FFF2-40B4-BE49-F238E27FC236}">
-                  <a16:creationId xmlns:a16="http://schemas.microsoft.com/office/drawing/2014/main" id="{4CAB6A46-FC4F-E678-F23E-3AC65B4F2995}"/>
-                </a:ext>
-              </a:extLst>
-            </p:cNvPr>
-            <p:cNvSpPr/>
-            <p:nvPr/>
-          </p:nvSpPr>
-          <p:spPr>
-            <a:xfrm rot="5400000" flipH="1">
-              <a:off x="6938359" y="2547861"/>
-              <a:ext cx="286619" cy="45719"/>
-            </a:xfrm>
-            <a:prstGeom prst="rect">
-              <a:avLst/>
-            </a:prstGeom>
+          </a:ln>
+        </p:spPr>
+        <p:style>
+          <a:lnRef idx="2">
+            <a:schemeClr val="accent1">
+              <a:shade val="15000"/>
+            </a:schemeClr>
+          </a:lnRef>
+          <a:fillRef idx="1">
+            <a:schemeClr val="accent1"/>
+          </a:fillRef>
+          <a:effectRef idx="0">
+            <a:schemeClr val="accent1"/>
+          </a:effectRef>
+          <a:fontRef idx="minor">
+            <a:schemeClr val="lt1"/>
+          </a:fontRef>
+        </p:style>
+        <p:txBody>
+          <a:bodyPr wrap="square" rtlCol="0" anchor="ctr">
+            <a:noAutofit/>
+          </a:bodyPr>
+          <a:lstStyle/>
+          <a:p>
+            <a:pPr algn="ctr"/>
+            <a:endParaRPr lang="en-ID"/>
+          </a:p>
+        </p:txBody>
+      </p:sp>
+      <p:sp>
+        <p:nvSpPr>
+          <p:cNvPr id="26" name="Rectangle 25">
+            <a:extLst>
+              <a:ext uri="{FF2B5EF4-FFF2-40B4-BE49-F238E27FC236}">
+                <a16:creationId xmlns:a16="http://schemas.microsoft.com/office/drawing/2014/main" id="{F7109290-7B06-4B6C-756C-B14A1D666340}"/>
+              </a:ext>
+            </a:extLst>
+          </p:cNvPr>
+          <p:cNvSpPr/>
+          <p:nvPr/>
+        </p:nvSpPr>
+        <p:spPr>
+          <a:xfrm>
+            <a:off x="5933344" y="2930722"/>
+            <a:ext cx="325315" cy="360000"/>
+          </a:xfrm>
+          <a:prstGeom prst="rect">
+            <a:avLst/>
+          </a:prstGeom>
+          <a:solidFill>
+            <a:schemeClr val="bg2">
+              <a:lumMod val="50000"/>
+            </a:schemeClr>
+          </a:solidFill>
+          <a:ln>
             <a:solidFill>
               <a:schemeClr val="tx1">
                 <a:lumMod val="75000"/>
                 <a:lumOff val="25000"/>
               </a:schemeClr>
             </a:solidFill>
-            <a:ln>
-              <a:solidFill>
-                <a:schemeClr val="tx1">
-                  <a:lumMod val="75000"/>
-                  <a:lumOff val="25000"/>
-                </a:schemeClr>
-              </a:solidFill>
-            </a:ln>
-          </p:spPr>
-          <p:style>
-            <a:lnRef idx="2">
-              <a:schemeClr val="accent1">
-                <a:shade val="15000"/>
-              </a:schemeClr>
-            </a:lnRef>
-            <a:fillRef idx="1">
-              <a:schemeClr val="accent1"/>
-            </a:fillRef>
-            <a:effectRef idx="0">
-              <a:schemeClr val="accent1"/>
-            </a:effectRef>
-            <a:fontRef idx="minor">
-              <a:schemeClr val="lt1"/>
-            </a:fontRef>
-          </p:style>
-          <p:txBody>
-            <a:bodyPr rtlCol="0" anchor="ctr"/>
-            <a:lstStyle/>
-            <a:p>
-              <a:pPr algn="ctr"/>
-              <a:endParaRPr lang="en-ID"/>
-            </a:p>
-          </p:txBody>
-        </p:sp>
-        <p:sp>
-          <p:nvSpPr>
-            <p:cNvPr id="37" name="Trapezoid 36">
-              <a:extLst>
-                <a:ext uri="{FF2B5EF4-FFF2-40B4-BE49-F238E27FC236}">
-                  <a16:creationId xmlns:a16="http://schemas.microsoft.com/office/drawing/2014/main" id="{24B27C3C-8576-9720-607E-6B379DD8EB82}"/>
-                </a:ext>
-              </a:extLst>
-            </p:cNvPr>
-            <p:cNvSpPr/>
-            <p:nvPr/>
-          </p:nvSpPr>
-          <p:spPr>
-            <a:xfrm>
-              <a:off x="5555999" y="3290722"/>
-              <a:ext cx="1080000" cy="360000"/>
-            </a:xfrm>
-            <a:prstGeom prst="trapezoid">
-              <a:avLst/>
-            </a:prstGeom>
-            <a:solidFill>
-              <a:schemeClr val="tx1">
-                <a:lumMod val="85000"/>
-                <a:lumOff val="15000"/>
-              </a:schemeClr>
-            </a:solidFill>
-            <a:ln>
-              <a:noFill/>
-            </a:ln>
-          </p:spPr>
-          <p:style>
-            <a:lnRef idx="2">
-              <a:schemeClr val="accent1">
-                <a:shade val="15000"/>
-              </a:schemeClr>
-            </a:lnRef>
-            <a:fillRef idx="1">
-              <a:schemeClr val="accent1"/>
-            </a:fillRef>
-            <a:effectRef idx="0">
-              <a:schemeClr val="accent1"/>
-            </a:effectRef>
-            <a:fontRef idx="minor">
-              <a:schemeClr val="lt1"/>
-            </a:fontRef>
-          </p:style>
-          <p:txBody>
-            <a:bodyPr rtlCol="0" anchor="ctr"/>
-            <a:lstStyle/>
-            <a:p>
-              <a:pPr algn="ctr"/>
-              <a:endParaRPr lang="en-ID" dirty="0"/>
-            </a:p>
-          </p:txBody>
-        </p:sp>
-        <p:sp>
-          <p:nvSpPr>
-            <p:cNvPr id="10" name="Rectangle 9">
-              <a:extLst>
-                <a:ext uri="{FF2B5EF4-FFF2-40B4-BE49-F238E27FC236}">
-                  <a16:creationId xmlns:a16="http://schemas.microsoft.com/office/drawing/2014/main" id="{333DDA61-F337-D683-325A-33F9260488A7}"/>
-                </a:ext>
-              </a:extLst>
-            </p:cNvPr>
-            <p:cNvSpPr/>
-            <p:nvPr/>
-          </p:nvSpPr>
-          <p:spPr>
-            <a:xfrm>
-              <a:off x="4673340" y="2291203"/>
-              <a:ext cx="325315" cy="45719"/>
-            </a:xfrm>
-            <a:prstGeom prst="rect">
-              <a:avLst/>
-            </a:prstGeom>
+          </a:ln>
+        </p:spPr>
+        <p:style>
+          <a:lnRef idx="2">
+            <a:schemeClr val="accent1">
+              <a:shade val="15000"/>
+            </a:schemeClr>
+          </a:lnRef>
+          <a:fillRef idx="1">
+            <a:schemeClr val="accent1"/>
+          </a:fillRef>
+          <a:effectRef idx="0">
+            <a:schemeClr val="accent1"/>
+          </a:effectRef>
+          <a:fontRef idx="minor">
+            <a:schemeClr val="lt1"/>
+          </a:fontRef>
+        </p:style>
+        <p:txBody>
+          <a:bodyPr rtlCol="0" anchor="ctr"/>
+          <a:lstStyle/>
+          <a:p>
+            <a:pPr algn="ctr"/>
+            <a:endParaRPr lang="en-ID"/>
+          </a:p>
+        </p:txBody>
+      </p:sp>
+      <p:sp>
+        <p:nvSpPr>
+          <p:cNvPr id="27" name="Rectangle 26">
+            <a:extLst>
+              <a:ext uri="{FF2B5EF4-FFF2-40B4-BE49-F238E27FC236}">
+                <a16:creationId xmlns:a16="http://schemas.microsoft.com/office/drawing/2014/main" id="{88705CEE-4C6E-2169-2732-51104412934A}"/>
+              </a:ext>
+            </a:extLst>
+          </p:cNvPr>
+          <p:cNvSpPr/>
+          <p:nvPr/>
+        </p:nvSpPr>
+        <p:spPr>
+          <a:xfrm>
+            <a:off x="5933342" y="2999448"/>
+            <a:ext cx="325315" cy="45719"/>
+          </a:xfrm>
+          <a:prstGeom prst="rect">
+            <a:avLst/>
+          </a:prstGeom>
+          <a:solidFill>
+            <a:schemeClr val="tx1">
+              <a:lumMod val="75000"/>
+              <a:lumOff val="25000"/>
+            </a:schemeClr>
+          </a:solidFill>
+          <a:ln>
             <a:solidFill>
               <a:schemeClr val="tx1">
                 <a:lumMod val="75000"/>
                 <a:lumOff val="25000"/>
               </a:schemeClr>
             </a:solidFill>
-            <a:ln>
-              <a:solidFill>
-                <a:schemeClr val="tx1">
-                  <a:lumMod val="75000"/>
-                  <a:lumOff val="25000"/>
-                </a:schemeClr>
-              </a:solidFill>
-            </a:ln>
-          </p:spPr>
-          <p:style>
-            <a:lnRef idx="2">
-              <a:schemeClr val="accent1">
-                <a:shade val="15000"/>
-              </a:schemeClr>
-            </a:lnRef>
-            <a:fillRef idx="1">
-              <a:schemeClr val="accent1"/>
-            </a:fillRef>
-            <a:effectRef idx="0">
-              <a:schemeClr val="accent1"/>
-            </a:effectRef>
-            <a:fontRef idx="minor">
-              <a:schemeClr val="lt1"/>
-            </a:fontRef>
-          </p:style>
-          <p:txBody>
-            <a:bodyPr rtlCol="0" anchor="ctr"/>
-            <a:lstStyle/>
-            <a:p>
-              <a:pPr algn="ctr"/>
-              <a:endParaRPr lang="en-ID"/>
-            </a:p>
-          </p:txBody>
-        </p:sp>
-        <p:sp>
-          <p:nvSpPr>
-            <p:cNvPr id="8" name="Rectangle 7">
-              <a:extLst>
-                <a:ext uri="{FF2B5EF4-FFF2-40B4-BE49-F238E27FC236}">
-                  <a16:creationId xmlns:a16="http://schemas.microsoft.com/office/drawing/2014/main" id="{A9DDD5B0-DC5D-FC27-EA35-2C8723103338}"/>
-                </a:ext>
-              </a:extLst>
-            </p:cNvPr>
-            <p:cNvSpPr/>
-            <p:nvPr/>
-          </p:nvSpPr>
-          <p:spPr>
-            <a:xfrm>
-              <a:off x="4673340" y="2136140"/>
-              <a:ext cx="325315" cy="45719"/>
-            </a:xfrm>
-            <a:prstGeom prst="rect">
-              <a:avLst/>
-            </a:prstGeom>
+          </a:ln>
+        </p:spPr>
+        <p:style>
+          <a:lnRef idx="2">
+            <a:schemeClr val="accent1">
+              <a:shade val="15000"/>
+            </a:schemeClr>
+          </a:lnRef>
+          <a:fillRef idx="1">
+            <a:schemeClr val="accent1"/>
+          </a:fillRef>
+          <a:effectRef idx="0">
+            <a:schemeClr val="accent1"/>
+          </a:effectRef>
+          <a:fontRef idx="minor">
+            <a:schemeClr val="lt1"/>
+          </a:fontRef>
+        </p:style>
+        <p:txBody>
+          <a:bodyPr rtlCol="0" anchor="ctr"/>
+          <a:lstStyle/>
+          <a:p>
+            <a:pPr algn="ctr"/>
+            <a:endParaRPr lang="en-ID"/>
+          </a:p>
+        </p:txBody>
+      </p:sp>
+      <p:sp>
+        <p:nvSpPr>
+          <p:cNvPr id="28" name="Rectangle 27">
+            <a:extLst>
+              <a:ext uri="{FF2B5EF4-FFF2-40B4-BE49-F238E27FC236}">
+                <a16:creationId xmlns:a16="http://schemas.microsoft.com/office/drawing/2014/main" id="{3F6F0C89-45D3-7A46-9287-D75EFD323244}"/>
+              </a:ext>
+            </a:extLst>
+          </p:cNvPr>
+          <p:cNvSpPr/>
+          <p:nvPr/>
+        </p:nvSpPr>
+        <p:spPr>
+          <a:xfrm>
+            <a:off x="5933342" y="3154511"/>
+            <a:ext cx="325315" cy="45719"/>
+          </a:xfrm>
+          <a:prstGeom prst="rect">
+            <a:avLst/>
+          </a:prstGeom>
+          <a:solidFill>
+            <a:schemeClr val="tx1">
+              <a:lumMod val="75000"/>
+              <a:lumOff val="25000"/>
+            </a:schemeClr>
+          </a:solidFill>
+          <a:ln>
             <a:solidFill>
               <a:schemeClr val="tx1">
                 <a:lumMod val="75000"/>
                 <a:lumOff val="25000"/>
               </a:schemeClr>
             </a:solidFill>
-            <a:ln>
-              <a:solidFill>
-                <a:schemeClr val="tx1">
-                  <a:lumMod val="75000"/>
-                  <a:lumOff val="25000"/>
-                </a:schemeClr>
-              </a:solidFill>
-            </a:ln>
-          </p:spPr>
-          <p:style>
-            <a:lnRef idx="2">
-              <a:schemeClr val="accent1">
-                <a:shade val="15000"/>
-              </a:schemeClr>
-            </a:lnRef>
-            <a:fillRef idx="1">
-              <a:schemeClr val="accent1"/>
-            </a:fillRef>
-            <a:effectRef idx="0">
-              <a:schemeClr val="accent1"/>
-            </a:effectRef>
-            <a:fontRef idx="minor">
-              <a:schemeClr val="lt1"/>
-            </a:fontRef>
-          </p:style>
-          <p:txBody>
-            <a:bodyPr rtlCol="0" anchor="ctr"/>
-            <a:lstStyle/>
-            <a:p>
-              <a:pPr algn="ctr"/>
-              <a:endParaRPr lang="en-ID"/>
-            </a:p>
-          </p:txBody>
-        </p:sp>
-        <p:sp>
-          <p:nvSpPr>
-            <p:cNvPr id="24" name="Rectangle 23">
-              <a:extLst>
-                <a:ext uri="{FF2B5EF4-FFF2-40B4-BE49-F238E27FC236}">
-                  <a16:creationId xmlns:a16="http://schemas.microsoft.com/office/drawing/2014/main" id="{91DEDF0E-5182-8C37-2164-78E278675FCC}"/>
-                </a:ext>
-              </a:extLst>
-            </p:cNvPr>
-            <p:cNvSpPr/>
-            <p:nvPr/>
-          </p:nvSpPr>
-          <p:spPr>
-            <a:xfrm>
-              <a:off x="7194079" y="2291201"/>
-              <a:ext cx="325315" cy="45719"/>
-            </a:xfrm>
-            <a:prstGeom prst="rect">
-              <a:avLst/>
-            </a:prstGeom>
+          </a:ln>
+        </p:spPr>
+        <p:style>
+          <a:lnRef idx="2">
+            <a:schemeClr val="accent1">
+              <a:shade val="15000"/>
+            </a:schemeClr>
+          </a:lnRef>
+          <a:fillRef idx="1">
+            <a:schemeClr val="accent1"/>
+          </a:fillRef>
+          <a:effectRef idx="0">
+            <a:schemeClr val="accent1"/>
+          </a:effectRef>
+          <a:fontRef idx="minor">
+            <a:schemeClr val="lt1"/>
+          </a:fontRef>
+        </p:style>
+        <p:txBody>
+          <a:bodyPr rtlCol="0" anchor="ctr"/>
+          <a:lstStyle/>
+          <a:p>
+            <a:pPr algn="ctr"/>
+            <a:endParaRPr lang="en-ID"/>
+          </a:p>
+        </p:txBody>
+      </p:sp>
+      <p:sp>
+        <p:nvSpPr>
+          <p:cNvPr id="35" name="Rectangle 34">
+            <a:extLst>
+              <a:ext uri="{FF2B5EF4-FFF2-40B4-BE49-F238E27FC236}">
+                <a16:creationId xmlns:a16="http://schemas.microsoft.com/office/drawing/2014/main" id="{FF20CA1C-4C86-F1DD-3899-7F7B98A20855}"/>
+              </a:ext>
+            </a:extLst>
+          </p:cNvPr>
+          <p:cNvSpPr/>
+          <p:nvPr/>
+        </p:nvSpPr>
+        <p:spPr>
+          <a:xfrm rot="5400000" flipH="1">
+            <a:off x="6791564" y="2547861"/>
+            <a:ext cx="286619" cy="45719"/>
+          </a:xfrm>
+          <a:prstGeom prst="rect">
+            <a:avLst/>
+          </a:prstGeom>
+          <a:solidFill>
+            <a:schemeClr val="tx1">
+              <a:lumMod val="75000"/>
+              <a:lumOff val="25000"/>
+            </a:schemeClr>
+          </a:solidFill>
+          <a:ln>
             <a:solidFill>
               <a:schemeClr val="tx1">
                 <a:lumMod val="75000"/>
                 <a:lumOff val="25000"/>
               </a:schemeClr>
             </a:solidFill>
-            <a:ln>
-              <a:solidFill>
-                <a:schemeClr val="tx1">
-                  <a:lumMod val="75000"/>
-                  <a:lumOff val="25000"/>
-                </a:schemeClr>
-              </a:solidFill>
-            </a:ln>
-          </p:spPr>
-          <p:style>
-            <a:lnRef idx="2">
-              <a:schemeClr val="accent1">
-                <a:shade val="15000"/>
-              </a:schemeClr>
-            </a:lnRef>
-            <a:fillRef idx="1">
-              <a:schemeClr val="accent1"/>
-            </a:fillRef>
-            <a:effectRef idx="0">
-              <a:schemeClr val="accent1"/>
-            </a:effectRef>
-            <a:fontRef idx="minor">
-              <a:schemeClr val="lt1"/>
-            </a:fontRef>
-          </p:style>
-          <p:txBody>
-            <a:bodyPr rtlCol="0" anchor="ctr"/>
-            <a:lstStyle/>
-            <a:p>
-              <a:pPr algn="ctr"/>
-              <a:endParaRPr lang="en-ID"/>
-            </a:p>
-          </p:txBody>
-        </p:sp>
-        <p:sp>
-          <p:nvSpPr>
-            <p:cNvPr id="23" name="Rectangle 22">
-              <a:extLst>
-                <a:ext uri="{FF2B5EF4-FFF2-40B4-BE49-F238E27FC236}">
-                  <a16:creationId xmlns:a16="http://schemas.microsoft.com/office/drawing/2014/main" id="{EC2A289A-2643-C27A-4F50-E8A61A582C86}"/>
-                </a:ext>
-              </a:extLst>
-            </p:cNvPr>
-            <p:cNvSpPr/>
-            <p:nvPr/>
-          </p:nvSpPr>
-          <p:spPr>
-            <a:xfrm>
-              <a:off x="7194079" y="2136138"/>
-              <a:ext cx="325315" cy="45719"/>
-            </a:xfrm>
-            <a:prstGeom prst="rect">
-              <a:avLst/>
-            </a:prstGeom>
+          </a:ln>
+        </p:spPr>
+        <p:style>
+          <a:lnRef idx="2">
+            <a:schemeClr val="accent1">
+              <a:shade val="15000"/>
+            </a:schemeClr>
+          </a:lnRef>
+          <a:fillRef idx="1">
+            <a:schemeClr val="accent1"/>
+          </a:fillRef>
+          <a:effectRef idx="0">
+            <a:schemeClr val="accent1"/>
+          </a:effectRef>
+          <a:fontRef idx="minor">
+            <a:schemeClr val="lt1"/>
+          </a:fontRef>
+        </p:style>
+        <p:txBody>
+          <a:bodyPr rtlCol="0" anchor="ctr"/>
+          <a:lstStyle/>
+          <a:p>
+            <a:pPr algn="ctr"/>
+            <a:endParaRPr lang="en-ID"/>
+          </a:p>
+        </p:txBody>
+      </p:sp>
+      <p:sp>
+        <p:nvSpPr>
+          <p:cNvPr id="36" name="Rectangle 35">
+            <a:extLst>
+              <a:ext uri="{FF2B5EF4-FFF2-40B4-BE49-F238E27FC236}">
+                <a16:creationId xmlns:a16="http://schemas.microsoft.com/office/drawing/2014/main" id="{4CAB6A46-FC4F-E678-F23E-3AC65B4F2995}"/>
+              </a:ext>
+            </a:extLst>
+          </p:cNvPr>
+          <p:cNvSpPr/>
+          <p:nvPr/>
+        </p:nvSpPr>
+        <p:spPr>
+          <a:xfrm rot="5400000" flipH="1">
+            <a:off x="6938359" y="2547861"/>
+            <a:ext cx="286619" cy="45719"/>
+          </a:xfrm>
+          <a:prstGeom prst="rect">
+            <a:avLst/>
+          </a:prstGeom>
+          <a:solidFill>
+            <a:schemeClr val="tx1">
+              <a:lumMod val="75000"/>
+              <a:lumOff val="25000"/>
+            </a:schemeClr>
+          </a:solidFill>
+          <a:ln>
             <a:solidFill>
               <a:schemeClr val="tx1">
                 <a:lumMod val="75000"/>
                 <a:lumOff val="25000"/>
               </a:schemeClr>
             </a:solidFill>
-            <a:ln>
-              <a:solidFill>
-                <a:schemeClr val="tx1">
-                  <a:lumMod val="75000"/>
-                  <a:lumOff val="25000"/>
-                </a:schemeClr>
-              </a:solidFill>
-            </a:ln>
-          </p:spPr>
-          <p:style>
-            <a:lnRef idx="2">
-              <a:schemeClr val="accent1">
-                <a:shade val="15000"/>
-              </a:schemeClr>
-            </a:lnRef>
-            <a:fillRef idx="1">
-              <a:schemeClr val="accent1"/>
-            </a:fillRef>
-            <a:effectRef idx="0">
-              <a:schemeClr val="accent1"/>
-            </a:effectRef>
-            <a:fontRef idx="minor">
-              <a:schemeClr val="lt1"/>
-            </a:fontRef>
-          </p:style>
-          <p:txBody>
-            <a:bodyPr rtlCol="0" anchor="ctr"/>
-            <a:lstStyle/>
-            <a:p>
-              <a:pPr algn="ctr"/>
-              <a:endParaRPr lang="en-ID"/>
-            </a:p>
-          </p:txBody>
-        </p:sp>
-        <p:sp>
-          <p:nvSpPr>
-            <p:cNvPr id="3" name="Rectangle 2">
-              <a:extLst>
-                <a:ext uri="{FF2B5EF4-FFF2-40B4-BE49-F238E27FC236}">
-                  <a16:creationId xmlns:a16="http://schemas.microsoft.com/office/drawing/2014/main" id="{D5D9083D-6C19-4E51-3106-03234ADA6D2C}"/>
-                </a:ext>
-              </a:extLst>
-            </p:cNvPr>
-            <p:cNvSpPr/>
-            <p:nvPr/>
-          </p:nvSpPr>
-          <p:spPr>
-            <a:xfrm>
-              <a:off x="4622213" y="1598182"/>
-              <a:ext cx="427567" cy="359490"/>
-            </a:xfrm>
-            <a:prstGeom prst="rect">
-              <a:avLst/>
-            </a:prstGeom>
-            <a:solidFill>
-              <a:schemeClr val="bg2"/>
-            </a:solidFill>
-            <a:ln>
-              <a:noFill/>
-            </a:ln>
-          </p:spPr>
-          <p:style>
-            <a:lnRef idx="2">
-              <a:schemeClr val="accent1">
-                <a:shade val="15000"/>
-              </a:schemeClr>
-            </a:lnRef>
-            <a:fillRef idx="1">
-              <a:schemeClr val="accent1"/>
-            </a:fillRef>
-            <a:effectRef idx="0">
-              <a:schemeClr val="accent1"/>
-            </a:effectRef>
-            <a:fontRef idx="minor">
-              <a:schemeClr val="lt1"/>
-            </a:fontRef>
-          </p:style>
-          <p:txBody>
-            <a:bodyPr rtlCol="0" anchor="ctr"/>
-            <a:lstStyle/>
-            <a:p>
-              <a:pPr algn="ctr"/>
-              <a:endParaRPr lang="en-ID"/>
-            </a:p>
-          </p:txBody>
-        </p:sp>
-        <p:sp>
-          <p:nvSpPr>
-            <p:cNvPr id="4" name="Trapezoid 3">
-              <a:extLst>
-                <a:ext uri="{FF2B5EF4-FFF2-40B4-BE49-F238E27FC236}">
-                  <a16:creationId xmlns:a16="http://schemas.microsoft.com/office/drawing/2014/main" id="{A66677DC-2B6C-0CB6-0511-A471B981862F}"/>
-                </a:ext>
-              </a:extLst>
-            </p:cNvPr>
-            <p:cNvSpPr/>
-            <p:nvPr/>
-          </p:nvSpPr>
-          <p:spPr>
-            <a:xfrm flipV="1">
-              <a:off x="6816000" y="1488440"/>
-              <a:ext cx="1080000" cy="580068"/>
-            </a:xfrm>
-            <a:prstGeom prst="trapezoid">
-              <a:avLst/>
-            </a:prstGeom>
+          </a:ln>
+        </p:spPr>
+        <p:style>
+          <a:lnRef idx="2">
+            <a:schemeClr val="accent1">
+              <a:shade val="15000"/>
+            </a:schemeClr>
+          </a:lnRef>
+          <a:fillRef idx="1">
+            <a:schemeClr val="accent1"/>
+          </a:fillRef>
+          <a:effectRef idx="0">
+            <a:schemeClr val="accent1"/>
+          </a:effectRef>
+          <a:fontRef idx="minor">
+            <a:schemeClr val="lt1"/>
+          </a:fontRef>
+        </p:style>
+        <p:txBody>
+          <a:bodyPr rtlCol="0" anchor="ctr"/>
+          <a:lstStyle/>
+          <a:p>
+            <a:pPr algn="ctr"/>
+            <a:endParaRPr lang="en-ID"/>
+          </a:p>
+        </p:txBody>
+      </p:sp>
+      <p:sp>
+        <p:nvSpPr>
+          <p:cNvPr id="37" name="Trapezoid 36">
+            <a:extLst>
+              <a:ext uri="{FF2B5EF4-FFF2-40B4-BE49-F238E27FC236}">
+                <a16:creationId xmlns:a16="http://schemas.microsoft.com/office/drawing/2014/main" id="{24B27C3C-8576-9720-607E-6B379DD8EB82}"/>
+              </a:ext>
+            </a:extLst>
+          </p:cNvPr>
+          <p:cNvSpPr/>
+          <p:nvPr/>
+        </p:nvSpPr>
+        <p:spPr>
+          <a:xfrm>
+            <a:off x="5555999" y="3290722"/>
+            <a:ext cx="1080000" cy="360000"/>
+          </a:xfrm>
+          <a:prstGeom prst="trapezoid">
+            <a:avLst/>
+          </a:prstGeom>
+          <a:solidFill>
+            <a:schemeClr val="tx1">
+              <a:lumMod val="85000"/>
+              <a:lumOff val="15000"/>
+            </a:schemeClr>
+          </a:solidFill>
+          <a:ln>
+            <a:noFill/>
+          </a:ln>
+        </p:spPr>
+        <p:style>
+          <a:lnRef idx="2">
+            <a:schemeClr val="accent1">
+              <a:shade val="15000"/>
+            </a:schemeClr>
+          </a:lnRef>
+          <a:fillRef idx="1">
+            <a:schemeClr val="accent1"/>
+          </a:fillRef>
+          <a:effectRef idx="0">
+            <a:schemeClr val="accent1"/>
+          </a:effectRef>
+          <a:fontRef idx="minor">
+            <a:schemeClr val="lt1"/>
+          </a:fontRef>
+        </p:style>
+        <p:txBody>
+          <a:bodyPr rtlCol="0" anchor="ctr"/>
+          <a:lstStyle/>
+          <a:p>
+            <a:pPr algn="ctr"/>
+            <a:endParaRPr lang="en-ID" dirty="0"/>
+          </a:p>
+        </p:txBody>
+      </p:sp>
+      <p:sp>
+        <p:nvSpPr>
+          <p:cNvPr id="10" name="Rectangle 9">
+            <a:extLst>
+              <a:ext uri="{FF2B5EF4-FFF2-40B4-BE49-F238E27FC236}">
+                <a16:creationId xmlns:a16="http://schemas.microsoft.com/office/drawing/2014/main" id="{333DDA61-F337-D683-325A-33F9260488A7}"/>
+              </a:ext>
+            </a:extLst>
+          </p:cNvPr>
+          <p:cNvSpPr/>
+          <p:nvPr/>
+        </p:nvSpPr>
+        <p:spPr>
+          <a:xfrm>
+            <a:off x="4673340" y="2291203"/>
+            <a:ext cx="325315" cy="45719"/>
+          </a:xfrm>
+          <a:prstGeom prst="rect">
+            <a:avLst/>
+          </a:prstGeom>
+          <a:solidFill>
+            <a:schemeClr val="tx1">
+              <a:lumMod val="75000"/>
+              <a:lumOff val="25000"/>
+            </a:schemeClr>
+          </a:solidFill>
+          <a:ln>
             <a:solidFill>
               <a:schemeClr val="tx1">
-                <a:lumMod val="85000"/>
-                <a:lumOff val="15000"/>
+                <a:lumMod val="75000"/>
+                <a:lumOff val="25000"/>
               </a:schemeClr>
             </a:solidFill>
-            <a:ln>
-              <a:noFill/>
-            </a:ln>
-          </p:spPr>
-          <p:style>
-            <a:lnRef idx="2">
-              <a:schemeClr val="accent1">
-                <a:shade val="15000"/>
+          </a:ln>
+        </p:spPr>
+        <p:style>
+          <a:lnRef idx="2">
+            <a:schemeClr val="accent1">
+              <a:shade val="15000"/>
+            </a:schemeClr>
+          </a:lnRef>
+          <a:fillRef idx="1">
+            <a:schemeClr val="accent1"/>
+          </a:fillRef>
+          <a:effectRef idx="0">
+            <a:schemeClr val="accent1"/>
+          </a:effectRef>
+          <a:fontRef idx="minor">
+            <a:schemeClr val="lt1"/>
+          </a:fontRef>
+        </p:style>
+        <p:txBody>
+          <a:bodyPr rtlCol="0" anchor="ctr"/>
+          <a:lstStyle/>
+          <a:p>
+            <a:pPr algn="ctr"/>
+            <a:endParaRPr lang="en-ID"/>
+          </a:p>
+        </p:txBody>
+      </p:sp>
+      <p:sp>
+        <p:nvSpPr>
+          <p:cNvPr id="8" name="Rectangle 7">
+            <a:extLst>
+              <a:ext uri="{FF2B5EF4-FFF2-40B4-BE49-F238E27FC236}">
+                <a16:creationId xmlns:a16="http://schemas.microsoft.com/office/drawing/2014/main" id="{A9DDD5B0-DC5D-FC27-EA35-2C8723103338}"/>
+              </a:ext>
+            </a:extLst>
+          </p:cNvPr>
+          <p:cNvSpPr/>
+          <p:nvPr/>
+        </p:nvSpPr>
+        <p:spPr>
+          <a:xfrm>
+            <a:off x="4673340" y="2136140"/>
+            <a:ext cx="325315" cy="45719"/>
+          </a:xfrm>
+          <a:prstGeom prst="rect">
+            <a:avLst/>
+          </a:prstGeom>
+          <a:solidFill>
+            <a:schemeClr val="tx1">
+              <a:lumMod val="75000"/>
+              <a:lumOff val="25000"/>
+            </a:schemeClr>
+          </a:solidFill>
+          <a:ln>
+            <a:solidFill>
+              <a:schemeClr val="tx1">
+                <a:lumMod val="75000"/>
+                <a:lumOff val="25000"/>
               </a:schemeClr>
-            </a:lnRef>
-            <a:fillRef idx="1">
-              <a:schemeClr val="accent1"/>
-            </a:fillRef>
-            <a:effectRef idx="0">
-              <a:schemeClr val="accent1"/>
-            </a:effectRef>
-            <a:fontRef idx="minor">
-              <a:schemeClr val="lt1"/>
-            </a:fontRef>
-          </p:style>
-          <p:txBody>
-            <a:bodyPr rtlCol="0" anchor="ctr"/>
-            <a:lstStyle/>
-            <a:p>
-              <a:pPr algn="ctr"/>
-              <a:endParaRPr lang="en-ID"/>
-            </a:p>
-          </p:txBody>
-        </p:sp>
-        <p:sp>
-          <p:nvSpPr>
-            <p:cNvPr id="6" name="Rectangle 5">
-              <a:extLst>
-                <a:ext uri="{FF2B5EF4-FFF2-40B4-BE49-F238E27FC236}">
-                  <a16:creationId xmlns:a16="http://schemas.microsoft.com/office/drawing/2014/main" id="{F48AFE4A-3F6F-713B-84E2-C4CE6B311E3D}"/>
-                </a:ext>
-              </a:extLst>
-            </p:cNvPr>
-            <p:cNvSpPr/>
-            <p:nvPr/>
-          </p:nvSpPr>
-          <p:spPr>
-            <a:xfrm>
-              <a:off x="7142213" y="1598182"/>
-              <a:ext cx="427567" cy="359490"/>
-            </a:xfrm>
-            <a:prstGeom prst="rect">
-              <a:avLst/>
-            </a:prstGeom>
+            </a:solidFill>
+          </a:ln>
+        </p:spPr>
+        <p:style>
+          <a:lnRef idx="2">
+            <a:schemeClr val="accent1">
+              <a:shade val="15000"/>
+            </a:schemeClr>
+          </a:lnRef>
+          <a:fillRef idx="1">
+            <a:schemeClr val="accent1"/>
+          </a:fillRef>
+          <a:effectRef idx="0">
+            <a:schemeClr val="accent1"/>
+          </a:effectRef>
+          <a:fontRef idx="minor">
+            <a:schemeClr val="lt1"/>
+          </a:fontRef>
+        </p:style>
+        <p:txBody>
+          <a:bodyPr rtlCol="0" anchor="ctr"/>
+          <a:lstStyle/>
+          <a:p>
+            <a:pPr algn="ctr"/>
+            <a:endParaRPr lang="en-ID"/>
+          </a:p>
+        </p:txBody>
+      </p:sp>
+      <p:sp>
+        <p:nvSpPr>
+          <p:cNvPr id="24" name="Rectangle 23">
+            <a:extLst>
+              <a:ext uri="{FF2B5EF4-FFF2-40B4-BE49-F238E27FC236}">
+                <a16:creationId xmlns:a16="http://schemas.microsoft.com/office/drawing/2014/main" id="{91DEDF0E-5182-8C37-2164-78E278675FCC}"/>
+              </a:ext>
+            </a:extLst>
+          </p:cNvPr>
+          <p:cNvSpPr/>
+          <p:nvPr/>
+        </p:nvSpPr>
+        <p:spPr>
+          <a:xfrm>
+            <a:off x="7194079" y="2291201"/>
+            <a:ext cx="325315" cy="45719"/>
+          </a:xfrm>
+          <a:prstGeom prst="rect">
+            <a:avLst/>
+          </a:prstGeom>
+          <a:solidFill>
+            <a:schemeClr val="tx1">
+              <a:lumMod val="75000"/>
+              <a:lumOff val="25000"/>
+            </a:schemeClr>
+          </a:solidFill>
+          <a:ln>
             <a:solidFill>
-              <a:schemeClr val="bg2"/>
+              <a:schemeClr val="tx1">
+                <a:lumMod val="75000"/>
+                <a:lumOff val="25000"/>
+              </a:schemeClr>
             </a:solidFill>
-            <a:ln>
-              <a:noFill/>
-            </a:ln>
-          </p:spPr>
-          <p:style>
-            <a:lnRef idx="2">
-              <a:schemeClr val="accent1">
-                <a:shade val="15000"/>
+          </a:ln>
+        </p:spPr>
+        <p:style>
+          <a:lnRef idx="2">
+            <a:schemeClr val="accent1">
+              <a:shade val="15000"/>
+            </a:schemeClr>
+          </a:lnRef>
+          <a:fillRef idx="1">
+            <a:schemeClr val="accent1"/>
+          </a:fillRef>
+          <a:effectRef idx="0">
+            <a:schemeClr val="accent1"/>
+          </a:effectRef>
+          <a:fontRef idx="minor">
+            <a:schemeClr val="lt1"/>
+          </a:fontRef>
+        </p:style>
+        <p:txBody>
+          <a:bodyPr rtlCol="0" anchor="ctr"/>
+          <a:lstStyle/>
+          <a:p>
+            <a:pPr algn="ctr"/>
+            <a:endParaRPr lang="en-ID"/>
+          </a:p>
+        </p:txBody>
+      </p:sp>
+      <p:sp>
+        <p:nvSpPr>
+          <p:cNvPr id="23" name="Rectangle 22">
+            <a:extLst>
+              <a:ext uri="{FF2B5EF4-FFF2-40B4-BE49-F238E27FC236}">
+                <a16:creationId xmlns:a16="http://schemas.microsoft.com/office/drawing/2014/main" id="{EC2A289A-2643-C27A-4F50-E8A61A582C86}"/>
+              </a:ext>
+            </a:extLst>
+          </p:cNvPr>
+          <p:cNvSpPr/>
+          <p:nvPr/>
+        </p:nvSpPr>
+        <p:spPr>
+          <a:xfrm>
+            <a:off x="7194079" y="2136138"/>
+            <a:ext cx="325315" cy="45719"/>
+          </a:xfrm>
+          <a:prstGeom prst="rect">
+            <a:avLst/>
+          </a:prstGeom>
+          <a:solidFill>
+            <a:schemeClr val="tx1">
+              <a:lumMod val="75000"/>
+              <a:lumOff val="25000"/>
+            </a:schemeClr>
+          </a:solidFill>
+          <a:ln>
+            <a:solidFill>
+              <a:schemeClr val="tx1">
+                <a:lumMod val="75000"/>
+                <a:lumOff val="25000"/>
               </a:schemeClr>
-            </a:lnRef>
-            <a:fillRef idx="1">
-              <a:schemeClr val="accent1"/>
-            </a:fillRef>
-            <a:effectRef idx="0">
-              <a:schemeClr val="accent1"/>
-            </a:effectRef>
-            <a:fontRef idx="minor">
-              <a:schemeClr val="lt1"/>
-            </a:fontRef>
-          </p:style>
-          <p:txBody>
-            <a:bodyPr rtlCol="0" anchor="ctr"/>
-            <a:lstStyle/>
-            <a:p>
-              <a:pPr algn="ctr"/>
-              <a:endParaRPr lang="en-ID"/>
-            </a:p>
-          </p:txBody>
-        </p:sp>
-      </p:grpSp>
+            </a:solidFill>
+          </a:ln>
+        </p:spPr>
+        <p:style>
+          <a:lnRef idx="2">
+            <a:schemeClr val="accent1">
+              <a:shade val="15000"/>
+            </a:schemeClr>
+          </a:lnRef>
+          <a:fillRef idx="1">
+            <a:schemeClr val="accent1"/>
+          </a:fillRef>
+          <a:effectRef idx="0">
+            <a:schemeClr val="accent1"/>
+          </a:effectRef>
+          <a:fontRef idx="minor">
+            <a:schemeClr val="lt1"/>
+          </a:fontRef>
+        </p:style>
+        <p:txBody>
+          <a:bodyPr rtlCol="0" anchor="ctr"/>
+          <a:lstStyle/>
+          <a:p>
+            <a:pPr algn="ctr"/>
+            <a:endParaRPr lang="en-ID"/>
+          </a:p>
+        </p:txBody>
+      </p:sp>
+      <p:sp>
+        <p:nvSpPr>
+          <p:cNvPr id="3" name="Rectangle 2">
+            <a:extLst>
+              <a:ext uri="{FF2B5EF4-FFF2-40B4-BE49-F238E27FC236}">
+                <a16:creationId xmlns:a16="http://schemas.microsoft.com/office/drawing/2014/main" id="{D5D9083D-6C19-4E51-3106-03234ADA6D2C}"/>
+              </a:ext>
+            </a:extLst>
+          </p:cNvPr>
+          <p:cNvSpPr/>
+          <p:nvPr/>
+        </p:nvSpPr>
+        <p:spPr>
+          <a:xfrm>
+            <a:off x="4622213" y="1598182"/>
+            <a:ext cx="427567" cy="359490"/>
+          </a:xfrm>
+          <a:prstGeom prst="rect">
+            <a:avLst/>
+          </a:prstGeom>
+          <a:solidFill>
+            <a:schemeClr val="bg2"/>
+          </a:solidFill>
+          <a:ln>
+            <a:noFill/>
+          </a:ln>
+        </p:spPr>
+        <p:style>
+          <a:lnRef idx="2">
+            <a:schemeClr val="accent1">
+              <a:shade val="15000"/>
+            </a:schemeClr>
+          </a:lnRef>
+          <a:fillRef idx="1">
+            <a:schemeClr val="accent1"/>
+          </a:fillRef>
+          <a:effectRef idx="0">
+            <a:schemeClr val="accent1"/>
+          </a:effectRef>
+          <a:fontRef idx="minor">
+            <a:schemeClr val="lt1"/>
+          </a:fontRef>
+        </p:style>
+        <p:txBody>
+          <a:bodyPr rtlCol="0" anchor="ctr"/>
+          <a:lstStyle/>
+          <a:p>
+            <a:pPr algn="ctr"/>
+            <a:endParaRPr lang="en-ID"/>
+          </a:p>
+        </p:txBody>
+      </p:sp>
+      <p:sp>
+        <p:nvSpPr>
+          <p:cNvPr id="4" name="Trapezoid 3">
+            <a:extLst>
+              <a:ext uri="{FF2B5EF4-FFF2-40B4-BE49-F238E27FC236}">
+                <a16:creationId xmlns:a16="http://schemas.microsoft.com/office/drawing/2014/main" id="{A66677DC-2B6C-0CB6-0511-A471B981862F}"/>
+              </a:ext>
+            </a:extLst>
+          </p:cNvPr>
+          <p:cNvSpPr/>
+          <p:nvPr/>
+        </p:nvSpPr>
+        <p:spPr>
+          <a:xfrm flipV="1">
+            <a:off x="6816000" y="1488440"/>
+            <a:ext cx="1080000" cy="580068"/>
+          </a:xfrm>
+          <a:prstGeom prst="trapezoid">
+            <a:avLst/>
+          </a:prstGeom>
+          <a:solidFill>
+            <a:schemeClr val="tx1">
+              <a:lumMod val="85000"/>
+              <a:lumOff val="15000"/>
+            </a:schemeClr>
+          </a:solidFill>
+          <a:ln>
+            <a:noFill/>
+          </a:ln>
+        </p:spPr>
+        <p:style>
+          <a:lnRef idx="2">
+            <a:schemeClr val="accent1">
+              <a:shade val="15000"/>
+            </a:schemeClr>
+          </a:lnRef>
+          <a:fillRef idx="1">
+            <a:schemeClr val="accent1"/>
+          </a:fillRef>
+          <a:effectRef idx="0">
+            <a:schemeClr val="accent1"/>
+          </a:effectRef>
+          <a:fontRef idx="minor">
+            <a:schemeClr val="lt1"/>
+          </a:fontRef>
+        </p:style>
+        <p:txBody>
+          <a:bodyPr rtlCol="0" anchor="ctr"/>
+          <a:lstStyle/>
+          <a:p>
+            <a:pPr algn="ctr"/>
+            <a:endParaRPr lang="en-ID"/>
+          </a:p>
+        </p:txBody>
+      </p:sp>
+      <p:sp>
+        <p:nvSpPr>
+          <p:cNvPr id="6" name="Rectangle 5">
+            <a:extLst>
+              <a:ext uri="{FF2B5EF4-FFF2-40B4-BE49-F238E27FC236}">
+                <a16:creationId xmlns:a16="http://schemas.microsoft.com/office/drawing/2014/main" id="{F48AFE4A-3F6F-713B-84E2-C4CE6B311E3D}"/>
+              </a:ext>
+            </a:extLst>
+          </p:cNvPr>
+          <p:cNvSpPr/>
+          <p:nvPr/>
+        </p:nvSpPr>
+        <p:spPr>
+          <a:xfrm>
+            <a:off x="7142213" y="1598182"/>
+            <a:ext cx="427567" cy="359490"/>
+          </a:xfrm>
+          <a:prstGeom prst="rect">
+            <a:avLst/>
+          </a:prstGeom>
+          <a:solidFill>
+            <a:schemeClr val="bg2"/>
+          </a:solidFill>
+          <a:ln>
+            <a:noFill/>
+          </a:ln>
+        </p:spPr>
+        <p:style>
+          <a:lnRef idx="2">
+            <a:schemeClr val="accent1">
+              <a:shade val="15000"/>
+            </a:schemeClr>
+          </a:lnRef>
+          <a:fillRef idx="1">
+            <a:schemeClr val="accent1"/>
+          </a:fillRef>
+          <a:effectRef idx="0">
+            <a:schemeClr val="accent1"/>
+          </a:effectRef>
+          <a:fontRef idx="minor">
+            <a:schemeClr val="lt1"/>
+          </a:fontRef>
+        </p:style>
+        <p:txBody>
+          <a:bodyPr rtlCol="0" anchor="ctr"/>
+          <a:lstStyle/>
+          <a:p>
+            <a:pPr algn="ctr"/>
+            <a:endParaRPr lang="en-ID"/>
+          </a:p>
+        </p:txBody>
+      </p:sp>
     </p:spTree>
     <p:extLst>
       <p:ext uri="{BB962C8B-B14F-4D97-AF65-F5344CB8AC3E}">
@@ -25094,6 +25065,521 @@
           </p:txBody>
         </p:sp>
       </p:grpSp>
+      <p:grpSp>
+        <p:nvGrpSpPr>
+          <p:cNvPr id="17" name="Group 16">
+            <a:extLst>
+              <a:ext uri="{FF2B5EF4-FFF2-40B4-BE49-F238E27FC236}">
+                <a16:creationId xmlns:a16="http://schemas.microsoft.com/office/drawing/2014/main" id="{94B0A8E8-336C-C654-A886-F6B3E8A0F1C6}"/>
+              </a:ext>
+            </a:extLst>
+          </p:cNvPr>
+          <p:cNvGrpSpPr/>
+          <p:nvPr/>
+        </p:nvGrpSpPr>
+        <p:grpSpPr>
+          <a:xfrm>
+            <a:off x="6658012" y="2035674"/>
+            <a:ext cx="2520000" cy="2880000"/>
+            <a:chOff x="6658012" y="2035674"/>
+            <a:chExt cx="2520000" cy="2880000"/>
+          </a:xfrm>
+        </p:grpSpPr>
+        <p:sp>
+          <p:nvSpPr>
+            <p:cNvPr id="5" name="Freeform: Shape 4">
+              <a:extLst>
+                <a:ext uri="{FF2B5EF4-FFF2-40B4-BE49-F238E27FC236}">
+                  <a16:creationId xmlns:a16="http://schemas.microsoft.com/office/drawing/2014/main" id="{CAEDC114-B58A-0B96-CAD3-50240EAB3BB7}"/>
+                </a:ext>
+              </a:extLst>
+            </p:cNvPr>
+            <p:cNvSpPr/>
+            <p:nvPr/>
+          </p:nvSpPr>
+          <p:spPr>
+            <a:xfrm>
+              <a:off x="6658012" y="2035674"/>
+              <a:ext cx="2520000" cy="2880000"/>
+            </a:xfrm>
+            <a:custGeom>
+              <a:avLst/>
+              <a:gdLst>
+                <a:gd name="csX0" fmla="*/ 1183677 w 2369574"/>
+                <a:gd name="csY0" fmla="*/ 0 h 2924441"/>
+                <a:gd name="csX1" fmla="*/ 1522926 w 2369574"/>
+                <a:gd name="csY1" fmla="*/ 132080 h 2924441"/>
+                <a:gd name="csX2" fmla="*/ 1525475 w 2369574"/>
+                <a:gd name="csY2" fmla="*/ 132080 h 2924441"/>
+                <a:gd name="csX3" fmla="*/ 1525475 w 2369574"/>
+                <a:gd name="csY3" fmla="*/ 749497 h 2924441"/>
+                <a:gd name="csX4" fmla="*/ 1537107 w 2369574"/>
+                <a:gd name="csY4" fmla="*/ 752302 h 2924441"/>
+                <a:gd name="csX5" fmla="*/ 2369574 w 2369574"/>
+                <a:gd name="csY5" fmla="*/ 1813396 h 2924441"/>
+                <a:gd name="csX6" fmla="*/ 1184787 w 2369574"/>
+                <a:gd name="csY6" fmla="*/ 2924441 h 2924441"/>
+                <a:gd name="csX7" fmla="*/ 0 w 2369574"/>
+                <a:gd name="csY7" fmla="*/ 1813396 h 2924441"/>
+                <a:gd name="csX8" fmla="*/ 832467 w 2369574"/>
+                <a:gd name="csY8" fmla="*/ 752302 h 2924441"/>
+                <a:gd name="csX9" fmla="*/ 844100 w 2369574"/>
+                <a:gd name="csY9" fmla="*/ 749497 h 2924441"/>
+                <a:gd name="csX10" fmla="*/ 844100 w 2369574"/>
+                <a:gd name="csY10" fmla="*/ 132080 h 2924441"/>
+                <a:gd name="csX11" fmla="*/ 844428 w 2369574"/>
+                <a:gd name="csY11" fmla="*/ 132080 h 2924441"/>
+                <a:gd name="csX12" fmla="*/ 1183677 w 2369574"/>
+                <a:gd name="csY12" fmla="*/ 0 h 2924441"/>
+              </a:gdLst>
+              <a:ahLst/>
+              <a:cxnLst>
+                <a:cxn ang="0">
+                  <a:pos x="csX0" y="csY0"/>
+                </a:cxn>
+                <a:cxn ang="0">
+                  <a:pos x="csX1" y="csY1"/>
+                </a:cxn>
+                <a:cxn ang="0">
+                  <a:pos x="csX2" y="csY2"/>
+                </a:cxn>
+                <a:cxn ang="0">
+                  <a:pos x="csX3" y="csY3"/>
+                </a:cxn>
+                <a:cxn ang="0">
+                  <a:pos x="csX4" y="csY4"/>
+                </a:cxn>
+                <a:cxn ang="0">
+                  <a:pos x="csX5" y="csY5"/>
+                </a:cxn>
+                <a:cxn ang="0">
+                  <a:pos x="csX6" y="csY6"/>
+                </a:cxn>
+                <a:cxn ang="0">
+                  <a:pos x="csX7" y="csY7"/>
+                </a:cxn>
+                <a:cxn ang="0">
+                  <a:pos x="csX8" y="csY8"/>
+                </a:cxn>
+                <a:cxn ang="0">
+                  <a:pos x="csX9" y="csY9"/>
+                </a:cxn>
+                <a:cxn ang="0">
+                  <a:pos x="csX10" y="csY10"/>
+                </a:cxn>
+                <a:cxn ang="0">
+                  <a:pos x="csX11" y="csY11"/>
+                </a:cxn>
+                <a:cxn ang="0">
+                  <a:pos x="csX12" y="csY12"/>
+                </a:cxn>
+              </a:cxnLst>
+              <a:rect l="l" t="t" r="r" b="b"/>
+              <a:pathLst>
+                <a:path w="2369574" h="2924441">
+                  <a:moveTo>
+                    <a:pt x="1183677" y="0"/>
+                  </a:moveTo>
+                  <a:cubicBezTo>
+                    <a:pt x="1371039" y="0"/>
+                    <a:pt x="1522926" y="59134"/>
+                    <a:pt x="1522926" y="132080"/>
+                  </a:cubicBezTo>
+                  <a:lnTo>
+                    <a:pt x="1525475" y="132080"/>
+                  </a:lnTo>
+                  <a:lnTo>
+                    <a:pt x="1525475" y="749497"/>
+                  </a:lnTo>
+                  <a:lnTo>
+                    <a:pt x="1537107" y="752302"/>
+                  </a:lnTo>
+                  <a:cubicBezTo>
+                    <a:pt x="2019396" y="892973"/>
+                    <a:pt x="2369574" y="1314836"/>
+                    <a:pt x="2369574" y="1813396"/>
+                  </a:cubicBezTo>
+                  <a:cubicBezTo>
+                    <a:pt x="2369574" y="2427009"/>
+                    <a:pt x="1839127" y="2924441"/>
+                    <a:pt x="1184787" y="2924441"/>
+                  </a:cubicBezTo>
+                  <a:cubicBezTo>
+                    <a:pt x="530447" y="2924441"/>
+                    <a:pt x="0" y="2427009"/>
+                    <a:pt x="0" y="1813396"/>
+                  </a:cubicBezTo>
+                  <a:cubicBezTo>
+                    <a:pt x="0" y="1314836"/>
+                    <a:pt x="350178" y="892973"/>
+                    <a:pt x="832467" y="752302"/>
+                  </a:cubicBezTo>
+                  <a:lnTo>
+                    <a:pt x="844100" y="749497"/>
+                  </a:lnTo>
+                  <a:lnTo>
+                    <a:pt x="844100" y="132080"/>
+                  </a:lnTo>
+                  <a:lnTo>
+                    <a:pt x="844428" y="132080"/>
+                  </a:lnTo>
+                  <a:cubicBezTo>
+                    <a:pt x="844428" y="59134"/>
+                    <a:pt x="996315" y="0"/>
+                    <a:pt x="1183677" y="0"/>
+                  </a:cubicBezTo>
+                  <a:close/>
+                </a:path>
+              </a:pathLst>
+            </a:custGeom>
+            <a:gradFill flip="none" rotWithShape="1">
+              <a:gsLst>
+                <a:gs pos="0">
+                  <a:schemeClr val="accent1">
+                    <a:lumMod val="5000"/>
+                    <a:lumOff val="95000"/>
+                    <a:alpha val="0"/>
+                  </a:schemeClr>
+                </a:gs>
+                <a:gs pos="100000">
+                  <a:schemeClr val="accent1">
+                    <a:lumMod val="5000"/>
+                    <a:lumOff val="95000"/>
+                    <a:alpha val="0"/>
+                  </a:schemeClr>
+                </a:gs>
+                <a:gs pos="50000">
+                  <a:schemeClr val="bg1"/>
+                </a:gs>
+              </a:gsLst>
+              <a:lin ang="2700000" scaled="1"/>
+              <a:tileRect/>
+            </a:gradFill>
+            <a:ln w="19050"/>
+          </p:spPr>
+          <p:style>
+            <a:lnRef idx="2">
+              <a:schemeClr val="accent1">
+                <a:shade val="15000"/>
+              </a:schemeClr>
+            </a:lnRef>
+            <a:fillRef idx="1">
+              <a:schemeClr val="accent1"/>
+            </a:fillRef>
+            <a:effectRef idx="0">
+              <a:schemeClr val="accent1"/>
+            </a:effectRef>
+            <a:fontRef idx="minor">
+              <a:schemeClr val="lt1"/>
+            </a:fontRef>
+          </p:style>
+          <p:txBody>
+            <a:bodyPr wrap="square" rtlCol="0" anchor="ctr">
+              <a:noAutofit/>
+            </a:bodyPr>
+            <a:lstStyle/>
+            <a:p>
+              <a:pPr algn="ctr"/>
+              <a:endParaRPr lang="en-ID"/>
+            </a:p>
+          </p:txBody>
+        </p:sp>
+        <p:sp>
+          <p:nvSpPr>
+            <p:cNvPr id="6" name="Oval 5">
+              <a:extLst>
+                <a:ext uri="{FF2B5EF4-FFF2-40B4-BE49-F238E27FC236}">
+                  <a16:creationId xmlns:a16="http://schemas.microsoft.com/office/drawing/2014/main" id="{933448EC-BDAA-2BF2-6AE1-BE728424D1AA}"/>
+                </a:ext>
+              </a:extLst>
+            </p:cNvPr>
+            <p:cNvSpPr/>
+            <p:nvPr/>
+          </p:nvSpPr>
+          <p:spPr>
+            <a:xfrm>
+              <a:off x="7558943" y="2035674"/>
+              <a:ext cx="721659" cy="264160"/>
+            </a:xfrm>
+            <a:prstGeom prst="ellipse">
+              <a:avLst/>
+            </a:prstGeom>
+            <a:gradFill flip="none" rotWithShape="1">
+              <a:gsLst>
+                <a:gs pos="0">
+                  <a:schemeClr val="accent1">
+                    <a:lumMod val="5000"/>
+                    <a:lumOff val="95000"/>
+                    <a:alpha val="0"/>
+                  </a:schemeClr>
+                </a:gs>
+                <a:gs pos="100000">
+                  <a:srgbClr val="F6F8FC">
+                    <a:alpha val="0"/>
+                  </a:srgbClr>
+                </a:gs>
+                <a:gs pos="50000">
+                  <a:srgbClr val="FFFFFF"/>
+                </a:gs>
+              </a:gsLst>
+              <a:lin ang="2700000" scaled="1"/>
+              <a:tileRect/>
+            </a:gradFill>
+            <a:ln w="19050"/>
+          </p:spPr>
+          <p:style>
+            <a:lnRef idx="2">
+              <a:schemeClr val="accent1">
+                <a:shade val="15000"/>
+              </a:schemeClr>
+            </a:lnRef>
+            <a:fillRef idx="1">
+              <a:schemeClr val="accent1"/>
+            </a:fillRef>
+            <a:effectRef idx="0">
+              <a:schemeClr val="accent1"/>
+            </a:effectRef>
+            <a:fontRef idx="minor">
+              <a:schemeClr val="lt1"/>
+            </a:fontRef>
+          </p:style>
+          <p:txBody>
+            <a:bodyPr rtlCol="0" anchor="ctr"/>
+            <a:lstStyle/>
+            <a:p>
+              <a:pPr algn="ctr"/>
+              <a:endParaRPr lang="en-ID" dirty="0"/>
+            </a:p>
+          </p:txBody>
+        </p:sp>
+        <p:sp>
+          <p:nvSpPr>
+            <p:cNvPr id="11" name="Freeform: Shape 10">
+              <a:extLst>
+                <a:ext uri="{FF2B5EF4-FFF2-40B4-BE49-F238E27FC236}">
+                  <a16:creationId xmlns:a16="http://schemas.microsoft.com/office/drawing/2014/main" id="{FD08F0F9-74E0-C663-F28B-3F6C7960B210}"/>
+                </a:ext>
+              </a:extLst>
+            </p:cNvPr>
+            <p:cNvSpPr/>
+            <p:nvPr/>
+          </p:nvSpPr>
+          <p:spPr>
+            <a:xfrm>
+              <a:off x="6711777" y="3205262"/>
+              <a:ext cx="2415988" cy="1649880"/>
+            </a:xfrm>
+            <a:custGeom>
+              <a:avLst/>
+              <a:gdLst>
+                <a:gd name="csX0" fmla="*/ 1206234 w 2415988"/>
+                <a:gd name="csY0" fmla="*/ 0 h 1649880"/>
+                <a:gd name="csX1" fmla="*/ 2265097 w 2415988"/>
+                <a:gd name="csY1" fmla="*/ 117475 h 1649880"/>
+                <a:gd name="csX2" fmla="*/ 2270100 w 2415988"/>
+                <a:gd name="csY2" fmla="*/ 117475 h 1649880"/>
+                <a:gd name="csX3" fmla="*/ 2270190 w 2415988"/>
+                <a:gd name="csY3" fmla="*/ 117602 h 1649880"/>
+                <a:gd name="csX4" fmla="*/ 2415988 w 2415988"/>
+                <a:gd name="csY4" fmla="*/ 612215 h 1649880"/>
+                <a:gd name="csX5" fmla="*/ 1207994 w 2415988"/>
+                <a:gd name="csY5" fmla="*/ 1649880 h 1649880"/>
+                <a:gd name="csX6" fmla="*/ 0 w 2415988"/>
+                <a:gd name="csY6" fmla="*/ 612215 h 1649880"/>
+                <a:gd name="csX7" fmla="*/ 145799 w 2415988"/>
+                <a:gd name="csY7" fmla="*/ 117602 h 1649880"/>
+                <a:gd name="csX8" fmla="*/ 145888 w 2415988"/>
+                <a:gd name="csY8" fmla="*/ 117475 h 1649880"/>
+                <a:gd name="csX9" fmla="*/ 147371 w 2415988"/>
+                <a:gd name="csY9" fmla="*/ 117475 h 1649880"/>
+                <a:gd name="csX10" fmla="*/ 1206234 w 2415988"/>
+                <a:gd name="csY10" fmla="*/ 0 h 1649880"/>
+              </a:gdLst>
+              <a:ahLst/>
+              <a:cxnLst>
+                <a:cxn ang="0">
+                  <a:pos x="csX0" y="csY0"/>
+                </a:cxn>
+                <a:cxn ang="0">
+                  <a:pos x="csX1" y="csY1"/>
+                </a:cxn>
+                <a:cxn ang="0">
+                  <a:pos x="csX2" y="csY2"/>
+                </a:cxn>
+                <a:cxn ang="0">
+                  <a:pos x="csX3" y="csY3"/>
+                </a:cxn>
+                <a:cxn ang="0">
+                  <a:pos x="csX4" y="csY4"/>
+                </a:cxn>
+                <a:cxn ang="0">
+                  <a:pos x="csX5" y="csY5"/>
+                </a:cxn>
+                <a:cxn ang="0">
+                  <a:pos x="csX6" y="csY6"/>
+                </a:cxn>
+                <a:cxn ang="0">
+                  <a:pos x="csX7" y="csY7"/>
+                </a:cxn>
+                <a:cxn ang="0">
+                  <a:pos x="csX8" y="csY8"/>
+                </a:cxn>
+                <a:cxn ang="0">
+                  <a:pos x="csX9" y="csY9"/>
+                </a:cxn>
+                <a:cxn ang="0">
+                  <a:pos x="csX10" y="csY10"/>
+                </a:cxn>
+              </a:cxnLst>
+              <a:rect l="l" t="t" r="r" b="b"/>
+              <a:pathLst>
+                <a:path w="2415988" h="1649880">
+                  <a:moveTo>
+                    <a:pt x="1206234" y="0"/>
+                  </a:moveTo>
+                  <a:cubicBezTo>
+                    <a:pt x="1791028" y="0"/>
+                    <a:pt x="2265097" y="52595"/>
+                    <a:pt x="2265097" y="117475"/>
+                  </a:cubicBezTo>
+                  <a:lnTo>
+                    <a:pt x="2270100" y="117475"/>
+                  </a:lnTo>
+                  <a:lnTo>
+                    <a:pt x="2270190" y="117602"/>
+                  </a:lnTo>
+                  <a:cubicBezTo>
+                    <a:pt x="2363172" y="264632"/>
+                    <a:pt x="2415988" y="433125"/>
+                    <a:pt x="2415988" y="612215"/>
+                  </a:cubicBezTo>
+                  <a:cubicBezTo>
+                    <a:pt x="2415988" y="1185302"/>
+                    <a:pt x="1875151" y="1649880"/>
+                    <a:pt x="1207994" y="1649880"/>
+                  </a:cubicBezTo>
+                  <a:cubicBezTo>
+                    <a:pt x="540837" y="1649880"/>
+                    <a:pt x="0" y="1185302"/>
+                    <a:pt x="0" y="612215"/>
+                  </a:cubicBezTo>
+                  <a:cubicBezTo>
+                    <a:pt x="0" y="433125"/>
+                    <a:pt x="52816" y="264632"/>
+                    <a:pt x="145799" y="117602"/>
+                  </a:cubicBezTo>
+                  <a:lnTo>
+                    <a:pt x="145888" y="117475"/>
+                  </a:lnTo>
+                  <a:lnTo>
+                    <a:pt x="147371" y="117475"/>
+                  </a:lnTo>
+                  <a:cubicBezTo>
+                    <a:pt x="147371" y="52595"/>
+                    <a:pt x="621440" y="0"/>
+                    <a:pt x="1206234" y="0"/>
+                  </a:cubicBezTo>
+                  <a:close/>
+                </a:path>
+              </a:pathLst>
+            </a:custGeom>
+            <a:gradFill flip="none" rotWithShape="1">
+              <a:gsLst>
+                <a:gs pos="0">
+                  <a:srgbClr val="B8A18A">
+                    <a:alpha val="0"/>
+                  </a:srgbClr>
+                </a:gs>
+                <a:gs pos="100000">
+                  <a:srgbClr val="3F2A1D">
+                    <a:alpha val="0"/>
+                  </a:srgbClr>
+                </a:gs>
+                <a:gs pos="50000">
+                  <a:srgbClr val="7A5A44"/>
+                </a:gs>
+              </a:gsLst>
+              <a:path path="circle">
+                <a:fillToRect l="50000" t="50000" r="50000" b="50000"/>
+              </a:path>
+              <a:tileRect/>
+            </a:gradFill>
+          </p:spPr>
+          <p:style>
+            <a:lnRef idx="2">
+              <a:schemeClr val="accent1">
+                <a:shade val="15000"/>
+              </a:schemeClr>
+            </a:lnRef>
+            <a:fillRef idx="1">
+              <a:schemeClr val="accent1"/>
+            </a:fillRef>
+            <a:effectRef idx="0">
+              <a:schemeClr val="accent1"/>
+            </a:effectRef>
+            <a:fontRef idx="minor">
+              <a:schemeClr val="lt1"/>
+            </a:fontRef>
+          </p:style>
+          <p:txBody>
+            <a:bodyPr wrap="square" rtlCol="0" anchor="ctr">
+              <a:noAutofit/>
+            </a:bodyPr>
+            <a:lstStyle/>
+            <a:p>
+              <a:pPr algn="ctr"/>
+              <a:endParaRPr lang="en-ID" dirty="0"/>
+            </a:p>
+          </p:txBody>
+        </p:sp>
+        <p:sp>
+          <p:nvSpPr>
+            <p:cNvPr id="12" name="Oval 11">
+              <a:extLst>
+                <a:ext uri="{FF2B5EF4-FFF2-40B4-BE49-F238E27FC236}">
+                  <a16:creationId xmlns:a16="http://schemas.microsoft.com/office/drawing/2014/main" id="{EB377A13-DC84-465E-DE2E-B5234F8F99D9}"/>
+                </a:ext>
+              </a:extLst>
+            </p:cNvPr>
+            <p:cNvSpPr/>
+            <p:nvPr/>
+          </p:nvSpPr>
+          <p:spPr>
+            <a:xfrm>
+              <a:off x="6859149" y="3205262"/>
+              <a:ext cx="2117725" cy="234950"/>
+            </a:xfrm>
+            <a:prstGeom prst="ellipse">
+              <a:avLst/>
+            </a:prstGeom>
+            <a:noFill/>
+          </p:spPr>
+          <p:style>
+            <a:lnRef idx="2">
+              <a:schemeClr val="accent1">
+                <a:shade val="15000"/>
+              </a:schemeClr>
+            </a:lnRef>
+            <a:fillRef idx="1">
+              <a:schemeClr val="accent1"/>
+            </a:fillRef>
+            <a:effectRef idx="0">
+              <a:schemeClr val="accent1"/>
+            </a:effectRef>
+            <a:fontRef idx="minor">
+              <a:schemeClr val="lt1"/>
+            </a:fontRef>
+          </p:style>
+          <p:txBody>
+            <a:bodyPr rtlCol="0" anchor="ctr"/>
+            <a:lstStyle/>
+            <a:p>
+              <a:pPr algn="ctr"/>
+              <a:endParaRPr lang="en-ID"/>
+            </a:p>
+          </p:txBody>
+        </p:sp>
+      </p:grpSp>
     </p:spTree>
     <p:extLst>
       <p:ext uri="{BB962C8B-B14F-4D97-AF65-F5344CB8AC3E}">
@@ -27765,6 +28251,558 @@
           <p:spPr>
             <a:xfrm>
               <a:off x="5037138" y="3397250"/>
+              <a:ext cx="2117725" cy="234950"/>
+            </a:xfrm>
+            <a:prstGeom prst="ellipse">
+              <a:avLst/>
+            </a:prstGeom>
+            <a:noFill/>
+          </p:spPr>
+          <p:style>
+            <a:lnRef idx="2">
+              <a:schemeClr val="accent1">
+                <a:shade val="15000"/>
+              </a:schemeClr>
+            </a:lnRef>
+            <a:fillRef idx="1">
+              <a:schemeClr val="accent1"/>
+            </a:fillRef>
+            <a:effectRef idx="0">
+              <a:schemeClr val="accent1"/>
+            </a:effectRef>
+            <a:fontRef idx="minor">
+              <a:schemeClr val="lt1"/>
+            </a:fontRef>
+          </p:style>
+          <p:txBody>
+            <a:bodyPr rtlCol="0" anchor="ctr"/>
+            <a:lstStyle/>
+            <a:p>
+              <a:pPr algn="ctr"/>
+              <a:endParaRPr lang="en-ID"/>
+            </a:p>
+          </p:txBody>
+        </p:sp>
+      </p:grpSp>
+      <p:grpSp>
+        <p:nvGrpSpPr>
+          <p:cNvPr id="12" name="Group 11">
+            <a:extLst>
+              <a:ext uri="{FF2B5EF4-FFF2-40B4-BE49-F238E27FC236}">
+                <a16:creationId xmlns:a16="http://schemas.microsoft.com/office/drawing/2014/main" id="{27DF04AC-0921-AD30-90B5-A66B0C796CD3}"/>
+              </a:ext>
+            </a:extLst>
+          </p:cNvPr>
+          <p:cNvGrpSpPr/>
+          <p:nvPr/>
+        </p:nvGrpSpPr>
+        <p:grpSpPr>
+          <a:xfrm>
+            <a:off x="8054034" y="1435510"/>
+            <a:ext cx="2520000" cy="3575730"/>
+            <a:chOff x="8054034" y="1435510"/>
+            <a:chExt cx="2520000" cy="3575730"/>
+          </a:xfrm>
+        </p:grpSpPr>
+        <p:sp>
+          <p:nvSpPr>
+            <p:cNvPr id="7" name="Freeform: Shape 6">
+              <a:extLst>
+                <a:ext uri="{FF2B5EF4-FFF2-40B4-BE49-F238E27FC236}">
+                  <a16:creationId xmlns:a16="http://schemas.microsoft.com/office/drawing/2014/main" id="{E8C3C613-907C-8BC1-A308-60AD26280309}"/>
+                </a:ext>
+              </a:extLst>
+            </p:cNvPr>
+            <p:cNvSpPr/>
+            <p:nvPr/>
+          </p:nvSpPr>
+          <p:spPr>
+            <a:xfrm>
+              <a:off x="8054034" y="2131240"/>
+              <a:ext cx="2520000" cy="2880000"/>
+            </a:xfrm>
+            <a:custGeom>
+              <a:avLst/>
+              <a:gdLst>
+                <a:gd name="csX0" fmla="*/ 1183677 w 2369574"/>
+                <a:gd name="csY0" fmla="*/ 0 h 2924441"/>
+                <a:gd name="csX1" fmla="*/ 1522926 w 2369574"/>
+                <a:gd name="csY1" fmla="*/ 132080 h 2924441"/>
+                <a:gd name="csX2" fmla="*/ 1525475 w 2369574"/>
+                <a:gd name="csY2" fmla="*/ 132080 h 2924441"/>
+                <a:gd name="csX3" fmla="*/ 1525475 w 2369574"/>
+                <a:gd name="csY3" fmla="*/ 749497 h 2924441"/>
+                <a:gd name="csX4" fmla="*/ 1537107 w 2369574"/>
+                <a:gd name="csY4" fmla="*/ 752302 h 2924441"/>
+                <a:gd name="csX5" fmla="*/ 2369574 w 2369574"/>
+                <a:gd name="csY5" fmla="*/ 1813396 h 2924441"/>
+                <a:gd name="csX6" fmla="*/ 1184787 w 2369574"/>
+                <a:gd name="csY6" fmla="*/ 2924441 h 2924441"/>
+                <a:gd name="csX7" fmla="*/ 0 w 2369574"/>
+                <a:gd name="csY7" fmla="*/ 1813396 h 2924441"/>
+                <a:gd name="csX8" fmla="*/ 832467 w 2369574"/>
+                <a:gd name="csY8" fmla="*/ 752302 h 2924441"/>
+                <a:gd name="csX9" fmla="*/ 844100 w 2369574"/>
+                <a:gd name="csY9" fmla="*/ 749497 h 2924441"/>
+                <a:gd name="csX10" fmla="*/ 844100 w 2369574"/>
+                <a:gd name="csY10" fmla="*/ 132080 h 2924441"/>
+                <a:gd name="csX11" fmla="*/ 844428 w 2369574"/>
+                <a:gd name="csY11" fmla="*/ 132080 h 2924441"/>
+                <a:gd name="csX12" fmla="*/ 1183677 w 2369574"/>
+                <a:gd name="csY12" fmla="*/ 0 h 2924441"/>
+              </a:gdLst>
+              <a:ahLst/>
+              <a:cxnLst>
+                <a:cxn ang="0">
+                  <a:pos x="csX0" y="csY0"/>
+                </a:cxn>
+                <a:cxn ang="0">
+                  <a:pos x="csX1" y="csY1"/>
+                </a:cxn>
+                <a:cxn ang="0">
+                  <a:pos x="csX2" y="csY2"/>
+                </a:cxn>
+                <a:cxn ang="0">
+                  <a:pos x="csX3" y="csY3"/>
+                </a:cxn>
+                <a:cxn ang="0">
+                  <a:pos x="csX4" y="csY4"/>
+                </a:cxn>
+                <a:cxn ang="0">
+                  <a:pos x="csX5" y="csY5"/>
+                </a:cxn>
+                <a:cxn ang="0">
+                  <a:pos x="csX6" y="csY6"/>
+                </a:cxn>
+                <a:cxn ang="0">
+                  <a:pos x="csX7" y="csY7"/>
+                </a:cxn>
+                <a:cxn ang="0">
+                  <a:pos x="csX8" y="csY8"/>
+                </a:cxn>
+                <a:cxn ang="0">
+                  <a:pos x="csX9" y="csY9"/>
+                </a:cxn>
+                <a:cxn ang="0">
+                  <a:pos x="csX10" y="csY10"/>
+                </a:cxn>
+                <a:cxn ang="0">
+                  <a:pos x="csX11" y="csY11"/>
+                </a:cxn>
+                <a:cxn ang="0">
+                  <a:pos x="csX12" y="csY12"/>
+                </a:cxn>
+              </a:cxnLst>
+              <a:rect l="l" t="t" r="r" b="b"/>
+              <a:pathLst>
+                <a:path w="2369574" h="2924441">
+                  <a:moveTo>
+                    <a:pt x="1183677" y="0"/>
+                  </a:moveTo>
+                  <a:cubicBezTo>
+                    <a:pt x="1371039" y="0"/>
+                    <a:pt x="1522926" y="59134"/>
+                    <a:pt x="1522926" y="132080"/>
+                  </a:cubicBezTo>
+                  <a:lnTo>
+                    <a:pt x="1525475" y="132080"/>
+                  </a:lnTo>
+                  <a:lnTo>
+                    <a:pt x="1525475" y="749497"/>
+                  </a:lnTo>
+                  <a:lnTo>
+                    <a:pt x="1537107" y="752302"/>
+                  </a:lnTo>
+                  <a:cubicBezTo>
+                    <a:pt x="2019396" y="892973"/>
+                    <a:pt x="2369574" y="1314836"/>
+                    <a:pt x="2369574" y="1813396"/>
+                  </a:cubicBezTo>
+                  <a:cubicBezTo>
+                    <a:pt x="2369574" y="2427009"/>
+                    <a:pt x="1839127" y="2924441"/>
+                    <a:pt x="1184787" y="2924441"/>
+                  </a:cubicBezTo>
+                  <a:cubicBezTo>
+                    <a:pt x="530447" y="2924441"/>
+                    <a:pt x="0" y="2427009"/>
+                    <a:pt x="0" y="1813396"/>
+                  </a:cubicBezTo>
+                  <a:cubicBezTo>
+                    <a:pt x="0" y="1314836"/>
+                    <a:pt x="350178" y="892973"/>
+                    <a:pt x="832467" y="752302"/>
+                  </a:cubicBezTo>
+                  <a:lnTo>
+                    <a:pt x="844100" y="749497"/>
+                  </a:lnTo>
+                  <a:lnTo>
+                    <a:pt x="844100" y="132080"/>
+                  </a:lnTo>
+                  <a:lnTo>
+                    <a:pt x="844428" y="132080"/>
+                  </a:lnTo>
+                  <a:cubicBezTo>
+                    <a:pt x="844428" y="59134"/>
+                    <a:pt x="996315" y="0"/>
+                    <a:pt x="1183677" y="0"/>
+                  </a:cubicBezTo>
+                  <a:close/>
+                </a:path>
+              </a:pathLst>
+            </a:custGeom>
+            <a:gradFill flip="none" rotWithShape="1">
+              <a:gsLst>
+                <a:gs pos="0">
+                  <a:schemeClr val="accent1">
+                    <a:lumMod val="5000"/>
+                    <a:lumOff val="95000"/>
+                    <a:alpha val="0"/>
+                  </a:schemeClr>
+                </a:gs>
+                <a:gs pos="100000">
+                  <a:schemeClr val="accent1">
+                    <a:lumMod val="5000"/>
+                    <a:lumOff val="95000"/>
+                    <a:alpha val="0"/>
+                  </a:schemeClr>
+                </a:gs>
+                <a:gs pos="50000">
+                  <a:schemeClr val="bg1"/>
+                </a:gs>
+              </a:gsLst>
+              <a:lin ang="2700000" scaled="1"/>
+              <a:tileRect/>
+            </a:gradFill>
+            <a:ln w="19050"/>
+          </p:spPr>
+          <p:style>
+            <a:lnRef idx="2">
+              <a:schemeClr val="accent1">
+                <a:shade val="15000"/>
+              </a:schemeClr>
+            </a:lnRef>
+            <a:fillRef idx="1">
+              <a:schemeClr val="accent1"/>
+            </a:fillRef>
+            <a:effectRef idx="0">
+              <a:schemeClr val="accent1"/>
+            </a:effectRef>
+            <a:fontRef idx="minor">
+              <a:schemeClr val="lt1"/>
+            </a:fontRef>
+          </p:style>
+          <p:txBody>
+            <a:bodyPr wrap="square" rtlCol="0" anchor="ctr">
+              <a:noAutofit/>
+            </a:bodyPr>
+            <a:lstStyle/>
+            <a:p>
+              <a:pPr algn="ctr"/>
+              <a:endParaRPr lang="en-ID" dirty="0"/>
+            </a:p>
+          </p:txBody>
+        </p:sp>
+        <p:sp>
+          <p:nvSpPr>
+            <p:cNvPr id="8" name="Rectangle 7">
+              <a:extLst>
+                <a:ext uri="{FF2B5EF4-FFF2-40B4-BE49-F238E27FC236}">
+                  <a16:creationId xmlns:a16="http://schemas.microsoft.com/office/drawing/2014/main" id="{2D726BE3-63EE-131C-7091-48A14F099C20}"/>
+                </a:ext>
+              </a:extLst>
+            </p:cNvPr>
+            <p:cNvSpPr/>
+            <p:nvPr/>
+          </p:nvSpPr>
+          <p:spPr>
+            <a:xfrm>
+              <a:off x="9112104" y="1435510"/>
+              <a:ext cx="403860" cy="2587850"/>
+            </a:xfrm>
+            <a:prstGeom prst="rect">
+              <a:avLst/>
+            </a:prstGeom>
+            <a:gradFill>
+              <a:gsLst>
+                <a:gs pos="0">
+                  <a:srgbClr val="B8A18A"/>
+                </a:gs>
+                <a:gs pos="50000">
+                  <a:srgbClr val="7A5A44"/>
+                </a:gs>
+                <a:gs pos="100000">
+                  <a:srgbClr val="3F2A1D"/>
+                </a:gs>
+              </a:gsLst>
+              <a:path path="circle">
+                <a:fillToRect l="50000" t="50000" r="50000" b="50000"/>
+              </a:path>
+            </a:gradFill>
+          </p:spPr>
+          <p:style>
+            <a:lnRef idx="2">
+              <a:schemeClr val="accent1">
+                <a:shade val="15000"/>
+              </a:schemeClr>
+            </a:lnRef>
+            <a:fillRef idx="1">
+              <a:schemeClr val="accent1"/>
+            </a:fillRef>
+            <a:effectRef idx="0">
+              <a:schemeClr val="accent1"/>
+            </a:effectRef>
+            <a:fontRef idx="minor">
+              <a:schemeClr val="lt1"/>
+            </a:fontRef>
+          </p:style>
+          <p:txBody>
+            <a:bodyPr rtlCol="0" anchor="ctr"/>
+            <a:lstStyle/>
+            <a:p>
+              <a:pPr algn="ctr"/>
+              <a:endParaRPr lang="en-ID"/>
+            </a:p>
+          </p:txBody>
+        </p:sp>
+        <p:sp>
+          <p:nvSpPr>
+            <p:cNvPr id="9" name="Oval 8">
+              <a:extLst>
+                <a:ext uri="{FF2B5EF4-FFF2-40B4-BE49-F238E27FC236}">
+                  <a16:creationId xmlns:a16="http://schemas.microsoft.com/office/drawing/2014/main" id="{10FA595A-15AE-F694-52F9-2A06DC34615C}"/>
+                </a:ext>
+              </a:extLst>
+            </p:cNvPr>
+            <p:cNvSpPr/>
+            <p:nvPr/>
+          </p:nvSpPr>
+          <p:spPr>
+            <a:xfrm>
+              <a:off x="8953205" y="2127850"/>
+              <a:ext cx="721659" cy="264160"/>
+            </a:xfrm>
+            <a:prstGeom prst="ellipse">
+              <a:avLst/>
+            </a:prstGeom>
+            <a:noFill/>
+            <a:ln w="19050"/>
+          </p:spPr>
+          <p:style>
+            <a:lnRef idx="2">
+              <a:schemeClr val="accent1">
+                <a:shade val="15000"/>
+              </a:schemeClr>
+            </a:lnRef>
+            <a:fillRef idx="1">
+              <a:schemeClr val="accent1"/>
+            </a:fillRef>
+            <a:effectRef idx="0">
+              <a:schemeClr val="accent1"/>
+            </a:effectRef>
+            <a:fontRef idx="minor">
+              <a:schemeClr val="lt1"/>
+            </a:fontRef>
+          </p:style>
+          <p:txBody>
+            <a:bodyPr rtlCol="0" anchor="ctr"/>
+            <a:lstStyle/>
+            <a:p>
+              <a:pPr algn="ctr"/>
+              <a:endParaRPr lang="en-ID" dirty="0"/>
+            </a:p>
+          </p:txBody>
+        </p:sp>
+        <p:sp>
+          <p:nvSpPr>
+            <p:cNvPr id="10" name="Freeform: Shape 9">
+              <a:extLst>
+                <a:ext uri="{FF2B5EF4-FFF2-40B4-BE49-F238E27FC236}">
+                  <a16:creationId xmlns:a16="http://schemas.microsoft.com/office/drawing/2014/main" id="{33589BAB-41B1-7B10-8770-82EF1F153A38}"/>
+                </a:ext>
+              </a:extLst>
+            </p:cNvPr>
+            <p:cNvSpPr/>
+            <p:nvPr/>
+          </p:nvSpPr>
+          <p:spPr>
+            <a:xfrm>
+              <a:off x="8106040" y="3397250"/>
+              <a:ext cx="2415988" cy="1555750"/>
+            </a:xfrm>
+            <a:custGeom>
+              <a:avLst/>
+              <a:gdLst>
+                <a:gd name="csX0" fmla="*/ 1206234 w 2415988"/>
+                <a:gd name="csY0" fmla="*/ 0 h 1649880"/>
+                <a:gd name="csX1" fmla="*/ 2265097 w 2415988"/>
+                <a:gd name="csY1" fmla="*/ 117475 h 1649880"/>
+                <a:gd name="csX2" fmla="*/ 2270100 w 2415988"/>
+                <a:gd name="csY2" fmla="*/ 117475 h 1649880"/>
+                <a:gd name="csX3" fmla="*/ 2270190 w 2415988"/>
+                <a:gd name="csY3" fmla="*/ 117602 h 1649880"/>
+                <a:gd name="csX4" fmla="*/ 2415988 w 2415988"/>
+                <a:gd name="csY4" fmla="*/ 612215 h 1649880"/>
+                <a:gd name="csX5" fmla="*/ 1207994 w 2415988"/>
+                <a:gd name="csY5" fmla="*/ 1649880 h 1649880"/>
+                <a:gd name="csX6" fmla="*/ 0 w 2415988"/>
+                <a:gd name="csY6" fmla="*/ 612215 h 1649880"/>
+                <a:gd name="csX7" fmla="*/ 145799 w 2415988"/>
+                <a:gd name="csY7" fmla="*/ 117602 h 1649880"/>
+                <a:gd name="csX8" fmla="*/ 145888 w 2415988"/>
+                <a:gd name="csY8" fmla="*/ 117475 h 1649880"/>
+                <a:gd name="csX9" fmla="*/ 147371 w 2415988"/>
+                <a:gd name="csY9" fmla="*/ 117475 h 1649880"/>
+                <a:gd name="csX10" fmla="*/ 1206234 w 2415988"/>
+                <a:gd name="csY10" fmla="*/ 0 h 1649880"/>
+              </a:gdLst>
+              <a:ahLst/>
+              <a:cxnLst>
+                <a:cxn ang="0">
+                  <a:pos x="csX0" y="csY0"/>
+                </a:cxn>
+                <a:cxn ang="0">
+                  <a:pos x="csX1" y="csY1"/>
+                </a:cxn>
+                <a:cxn ang="0">
+                  <a:pos x="csX2" y="csY2"/>
+                </a:cxn>
+                <a:cxn ang="0">
+                  <a:pos x="csX3" y="csY3"/>
+                </a:cxn>
+                <a:cxn ang="0">
+                  <a:pos x="csX4" y="csY4"/>
+                </a:cxn>
+                <a:cxn ang="0">
+                  <a:pos x="csX5" y="csY5"/>
+                </a:cxn>
+                <a:cxn ang="0">
+                  <a:pos x="csX6" y="csY6"/>
+                </a:cxn>
+                <a:cxn ang="0">
+                  <a:pos x="csX7" y="csY7"/>
+                </a:cxn>
+                <a:cxn ang="0">
+                  <a:pos x="csX8" y="csY8"/>
+                </a:cxn>
+                <a:cxn ang="0">
+                  <a:pos x="csX9" y="csY9"/>
+                </a:cxn>
+                <a:cxn ang="0">
+                  <a:pos x="csX10" y="csY10"/>
+                </a:cxn>
+              </a:cxnLst>
+              <a:rect l="l" t="t" r="r" b="b"/>
+              <a:pathLst>
+                <a:path w="2415988" h="1649880">
+                  <a:moveTo>
+                    <a:pt x="1206234" y="0"/>
+                  </a:moveTo>
+                  <a:cubicBezTo>
+                    <a:pt x="1791028" y="0"/>
+                    <a:pt x="2265097" y="52595"/>
+                    <a:pt x="2265097" y="117475"/>
+                  </a:cubicBezTo>
+                  <a:lnTo>
+                    <a:pt x="2270100" y="117475"/>
+                  </a:lnTo>
+                  <a:lnTo>
+                    <a:pt x="2270190" y="117602"/>
+                  </a:lnTo>
+                  <a:cubicBezTo>
+                    <a:pt x="2363172" y="264632"/>
+                    <a:pt x="2415988" y="433125"/>
+                    <a:pt x="2415988" y="612215"/>
+                  </a:cubicBezTo>
+                  <a:cubicBezTo>
+                    <a:pt x="2415988" y="1185302"/>
+                    <a:pt x="1875151" y="1649880"/>
+                    <a:pt x="1207994" y="1649880"/>
+                  </a:cubicBezTo>
+                  <a:cubicBezTo>
+                    <a:pt x="540837" y="1649880"/>
+                    <a:pt x="0" y="1185302"/>
+                    <a:pt x="0" y="612215"/>
+                  </a:cubicBezTo>
+                  <a:cubicBezTo>
+                    <a:pt x="0" y="433125"/>
+                    <a:pt x="52816" y="264632"/>
+                    <a:pt x="145799" y="117602"/>
+                  </a:cubicBezTo>
+                  <a:lnTo>
+                    <a:pt x="145888" y="117475"/>
+                  </a:lnTo>
+                  <a:lnTo>
+                    <a:pt x="147371" y="117475"/>
+                  </a:lnTo>
+                  <a:cubicBezTo>
+                    <a:pt x="147371" y="52595"/>
+                    <a:pt x="621440" y="0"/>
+                    <a:pt x="1206234" y="0"/>
+                  </a:cubicBezTo>
+                  <a:close/>
+                </a:path>
+              </a:pathLst>
+            </a:custGeom>
+            <a:gradFill>
+              <a:gsLst>
+                <a:gs pos="0">
+                  <a:srgbClr val="B8A18A"/>
+                </a:gs>
+                <a:gs pos="50000">
+                  <a:srgbClr val="7A5A44"/>
+                </a:gs>
+                <a:gs pos="100000">
+                  <a:srgbClr val="3F2A1D"/>
+                </a:gs>
+              </a:gsLst>
+              <a:path path="circle">
+                <a:fillToRect l="50000" t="50000" r="50000" b="50000"/>
+              </a:path>
+            </a:gradFill>
+          </p:spPr>
+          <p:style>
+            <a:lnRef idx="2">
+              <a:schemeClr val="accent1">
+                <a:shade val="15000"/>
+              </a:schemeClr>
+            </a:lnRef>
+            <a:fillRef idx="1">
+              <a:schemeClr val="accent1"/>
+            </a:fillRef>
+            <a:effectRef idx="0">
+              <a:schemeClr val="accent1"/>
+            </a:effectRef>
+            <a:fontRef idx="minor">
+              <a:schemeClr val="lt1"/>
+            </a:fontRef>
+          </p:style>
+          <p:txBody>
+            <a:bodyPr wrap="square" rtlCol="0" anchor="ctr">
+              <a:noAutofit/>
+            </a:bodyPr>
+            <a:lstStyle/>
+            <a:p>
+              <a:pPr algn="ctr"/>
+              <a:endParaRPr lang="en-ID"/>
+            </a:p>
+          </p:txBody>
+        </p:sp>
+        <p:sp>
+          <p:nvSpPr>
+            <p:cNvPr id="11" name="Oval 10">
+              <a:extLst>
+                <a:ext uri="{FF2B5EF4-FFF2-40B4-BE49-F238E27FC236}">
+                  <a16:creationId xmlns:a16="http://schemas.microsoft.com/office/drawing/2014/main" id="{95A3EDAA-F9F9-2F25-3304-C3535489ACF2}"/>
+                </a:ext>
+              </a:extLst>
+            </p:cNvPr>
+            <p:cNvSpPr/>
+            <p:nvPr/>
+          </p:nvSpPr>
+          <p:spPr>
+            <a:xfrm>
+              <a:off x="8255172" y="3397250"/>
               <a:ext cx="2117725" cy="234950"/>
             </a:xfrm>
             <a:prstGeom prst="ellipse">

</xml_diff>